<commit_message>
Next version of slides (v0.8 baseline)
</commit_message>
<xml_diff>
--- a/slides/05-summary.pptx
+++ b/slides/05-summary.pptx
@@ -5,17 +5,20 @@
     <p:sldMasterId id="2147483660" r:id="rId1"/>
   </p:sldMasterIdLst>
   <p:notesMasterIdLst>
-    <p:notesMasterId r:id="rId7"/>
+    <p:notesMasterId r:id="rId10"/>
   </p:notesMasterIdLst>
   <p:handoutMasterIdLst>
-    <p:handoutMasterId r:id="rId8"/>
+    <p:handoutMasterId r:id="rId11"/>
   </p:handoutMasterIdLst>
   <p:sldIdLst>
     <p:sldId id="435" r:id="rId2"/>
-    <p:sldId id="442" r:id="rId3"/>
+    <p:sldId id="444" r:id="rId3"/>
     <p:sldId id="441" r:id="rId4"/>
     <p:sldId id="437" r:id="rId5"/>
-    <p:sldId id="443" r:id="rId6"/>
+    <p:sldId id="445" r:id="rId6"/>
+    <p:sldId id="446" r:id="rId7"/>
+    <p:sldId id="447" r:id="rId8"/>
+    <p:sldId id="448" r:id="rId9"/>
   </p:sldIdLst>
   <p:sldSz cx="12192000" cy="6858000"/>
   <p:notesSz cx="6858000" cy="9144000"/>
@@ -204,7 +207,7 @@
           <a:p>
             <a:fld id="{A07BA2DA-643A-463C-866E-F35E694B91DA}" type="datetimeFigureOut">
               <a:rPr lang="de-DE" smtClean="0"/>
-              <a:t>24.10.16</a:t>
+              <a:t>30.10.16</a:t>
             </a:fld>
             <a:endParaRPr lang="de-DE"/>
           </a:p>
@@ -370,7 +373,7 @@
           <a:p>
             <a:fld id="{77CDB449-486F-456A-B109-598711D3768F}" type="datetimeFigureOut">
               <a:rPr lang="de-DE" smtClean="0"/>
-              <a:t>24.10.16</a:t>
+              <a:t>30.10.16</a:t>
             </a:fld>
             <a:endParaRPr lang="de-DE"/>
           </a:p>
@@ -1151,7 +1154,7 @@
           <a:p>
             <a:fld id="{7F2FE8F5-41A3-4301-A47F-31831316DC49}" type="datetime4">
               <a:rPr lang="de-DE" smtClean="0"/>
-              <a:t>24. October 2016</a:t>
+              <a:t>30. October 2016</a:t>
             </a:fld>
             <a:endParaRPr lang="de-DE"/>
           </a:p>
@@ -1364,7 +1367,7 @@
           <a:p>
             <a:fld id="{47F9C7B1-2EC2-4381-AE6A-D48C16AF6BB3}" type="datetime4">
               <a:rPr lang="de-DE" smtClean="0"/>
-              <a:t>24. October 2016</a:t>
+              <a:t>30. October 2016</a:t>
             </a:fld>
             <a:endParaRPr lang="de-DE" dirty="0"/>
           </a:p>
@@ -1821,7 +1824,7 @@
           <a:p>
             <a:fld id="{5EDDF41F-C0CD-4D6D-B1B8-371D59A6A595}" type="datetime4">
               <a:rPr lang="de-DE" smtClean="0"/>
-              <a:t>24. October 2016</a:t>
+              <a:t>30. October 2016</a:t>
             </a:fld>
             <a:endParaRPr lang="de-DE" dirty="0"/>
           </a:p>
@@ -2278,7 +2281,7 @@
           <a:p>
             <a:fld id="{6BF642D4-A5D5-48EB-8816-07EBA5FFB1EE}" type="datetime4">
               <a:rPr lang="de-DE" smtClean="0"/>
-              <a:t>24. October 2016</a:t>
+              <a:t>30. October 2016</a:t>
             </a:fld>
             <a:endParaRPr lang="de-DE" dirty="0"/>
           </a:p>
@@ -2735,7 +2738,7 @@
           <a:p>
             <a:fld id="{B11C4843-1809-40E5-8578-E03375F47FBB}" type="datetime4">
               <a:rPr lang="de-DE" smtClean="0"/>
-              <a:t>24. October 2016</a:t>
+              <a:t>30. October 2016</a:t>
             </a:fld>
             <a:endParaRPr lang="de-DE" dirty="0"/>
           </a:p>
@@ -3192,7 +3195,7 @@
           <a:p>
             <a:fld id="{883A4E86-E105-42C2-BFCD-87B6057E2C9B}" type="datetime4">
               <a:rPr lang="de-DE" smtClean="0"/>
-              <a:t>24. October 2016</a:t>
+              <a:t>30. October 2016</a:t>
             </a:fld>
             <a:endParaRPr lang="de-DE" dirty="0"/>
           </a:p>
@@ -3649,7 +3652,7 @@
           <a:p>
             <a:fld id="{627DAB0F-5D0B-4037-9758-854518C8BB94}" type="datetime4">
               <a:rPr lang="de-DE" smtClean="0"/>
-              <a:t>24. October 2016</a:t>
+              <a:t>30. October 2016</a:t>
             </a:fld>
             <a:endParaRPr lang="de-DE" dirty="0"/>
           </a:p>
@@ -4106,7 +4109,7 @@
           <a:p>
             <a:fld id="{ADB60C92-C9DA-4155-9A8C-48BE6E179608}" type="datetime4">
               <a:rPr lang="de-DE" smtClean="0"/>
-              <a:t>24. October 2016</a:t>
+              <a:t>30. October 2016</a:t>
             </a:fld>
             <a:endParaRPr lang="de-DE" dirty="0"/>
           </a:p>
@@ -4563,7 +4566,7 @@
           <a:p>
             <a:fld id="{8135CF49-9A73-47A7-8F65-8E7E92988D2A}" type="datetime4">
               <a:rPr lang="de-DE" smtClean="0"/>
-              <a:t>24. October 2016</a:t>
+              <a:t>30. October 2016</a:t>
             </a:fld>
             <a:endParaRPr lang="de-DE" dirty="0"/>
           </a:p>
@@ -5020,7 +5023,7 @@
           <a:p>
             <a:fld id="{76224FF2-59FA-4BA9-B22B-606D9A3E51CA}" type="datetime4">
               <a:rPr lang="de-DE" smtClean="0"/>
-              <a:t>24. October 2016</a:t>
+              <a:t>30. October 2016</a:t>
             </a:fld>
             <a:endParaRPr lang="de-DE" dirty="0"/>
           </a:p>
@@ -5371,7 +5374,7 @@
           <a:graphicData uri="http://schemas.openxmlformats.org/presentationml/2006/ole">
             <mc:AlternateContent xmlns:mc="http://schemas.openxmlformats.org/markup-compatibility/2006">
               <mc:Choice xmlns:v="urn:schemas-microsoft-com:vml" Requires="v">
-                <p:oleObj spid="_x0000_s2653" name="think-cell Folie" r:id="rId4" imgW="270" imgH="270" progId="TCLayout.ActiveDocument.1">
+                <p:oleObj spid="_x0000_s2657" name="think-cell Folie" r:id="rId4" imgW="270" imgH="270" progId="TCLayout.ActiveDocument.1">
                   <p:embed/>
                 </p:oleObj>
               </mc:Choice>
@@ -5892,7 +5895,7 @@
           <a:p>
             <a:fld id="{EA1FED02-8F29-43DF-99E3-E0A5929004FF}" type="datetime4">
               <a:rPr lang="de-DE" smtClean="0"/>
-              <a:t>24. October 2016</a:t>
+              <a:t>30. October 2016</a:t>
             </a:fld>
             <a:endParaRPr lang="de-DE" dirty="0"/>
           </a:p>
@@ -6349,7 +6352,7 @@
           <a:p>
             <a:fld id="{0AB9FDA6-75A4-4AC5-A518-6C4F5DCE22DA}" type="datetime4">
               <a:rPr lang="de-DE" smtClean="0"/>
-              <a:t>24. October 2016</a:t>
+              <a:t>30. October 2016</a:t>
             </a:fld>
             <a:endParaRPr lang="de-DE" dirty="0"/>
           </a:p>
@@ -6806,7 +6809,7 @@
           <a:p>
             <a:fld id="{91D29804-6381-442D-8431-54AF06AA6573}" type="datetime4">
               <a:rPr lang="de-DE" smtClean="0"/>
-              <a:t>24. October 2016</a:t>
+              <a:t>30. October 2016</a:t>
             </a:fld>
             <a:endParaRPr lang="de-DE" dirty="0"/>
           </a:p>
@@ -7263,7 +7266,7 @@
           <a:p>
             <a:fld id="{4475A12F-773D-40F3-975C-324319C18717}" type="datetime4">
               <a:rPr lang="de-DE" smtClean="0"/>
-              <a:t>24. October 2016</a:t>
+              <a:t>30. October 2016</a:t>
             </a:fld>
             <a:endParaRPr lang="de-DE" dirty="0"/>
           </a:p>
@@ -7720,7 +7723,7 @@
           <a:p>
             <a:fld id="{4CA68869-28F7-4FC2-8022-69F8909D12EE}" type="datetime4">
               <a:rPr lang="de-DE" smtClean="0"/>
-              <a:t>24. October 2016</a:t>
+              <a:t>30. October 2016</a:t>
             </a:fld>
             <a:endParaRPr lang="de-DE" dirty="0"/>
           </a:p>
@@ -8177,7 +8180,7 @@
           <a:p>
             <a:fld id="{9D26D645-7457-46F8-A8FF-6A879952E15F}" type="datetime4">
               <a:rPr lang="de-DE" smtClean="0"/>
-              <a:t>24. October 2016</a:t>
+              <a:t>30. October 2016</a:t>
             </a:fld>
             <a:endParaRPr lang="de-DE" dirty="0"/>
           </a:p>
@@ -8634,7 +8637,7 @@
           <a:p>
             <a:fld id="{FC080181-388A-463F-B5F5-A0B0BA591070}" type="datetime4">
               <a:rPr lang="de-DE" smtClean="0"/>
-              <a:t>24. October 2016</a:t>
+              <a:t>30. October 2016</a:t>
             </a:fld>
             <a:endParaRPr lang="de-DE" dirty="0"/>
           </a:p>
@@ -9091,7 +9094,7 @@
           <a:p>
             <a:fld id="{CD65EB56-45A2-4D1A-9B6C-55DE4D0EDF5A}" type="datetime4">
               <a:rPr lang="de-DE" smtClean="0"/>
-              <a:t>24. October 2016</a:t>
+              <a:t>30. October 2016</a:t>
             </a:fld>
             <a:endParaRPr lang="de-DE" dirty="0"/>
           </a:p>
@@ -9548,7 +9551,7 @@
           <a:p>
             <a:fld id="{0DAF41A4-9F3F-4224-A411-7368417F9465}" type="datetime4">
               <a:rPr lang="de-DE" smtClean="0"/>
-              <a:t>24. October 2016</a:t>
+              <a:t>30. October 2016</a:t>
             </a:fld>
             <a:endParaRPr lang="de-DE" dirty="0"/>
           </a:p>
@@ -10005,7 +10008,7 @@
           <a:p>
             <a:fld id="{6D5FE5AD-E500-4D34-9E44-6DC9EBD25FB2}" type="datetime4">
               <a:rPr lang="de-DE" smtClean="0"/>
-              <a:t>24. October 2016</a:t>
+              <a:t>30. October 2016</a:t>
             </a:fld>
             <a:endParaRPr lang="de-DE" dirty="0"/>
           </a:p>
@@ -10356,7 +10359,7 @@
           <a:graphicData uri="http://schemas.openxmlformats.org/presentationml/2006/ole">
             <mc:AlternateContent xmlns:mc="http://schemas.openxmlformats.org/markup-compatibility/2006">
               <mc:Choice xmlns:v="urn:schemas-microsoft-com:vml" Requires="v">
-                <p:oleObj spid="_x0000_s3676" name="think-cell Folie" r:id="rId4" imgW="270" imgH="270" progId="TCLayout.ActiveDocument.1">
+                <p:oleObj spid="_x0000_s3680" name="think-cell Folie" r:id="rId4" imgW="270" imgH="270" progId="TCLayout.ActiveDocument.1">
                   <p:embed/>
                 </p:oleObj>
               </mc:Choice>
@@ -10867,7 +10870,7 @@
           <a:p>
             <a:fld id="{54235FCF-D5BC-44C9-B9DE-48EFF4593A2D}" type="datetime4">
               <a:rPr lang="de-DE" smtClean="0"/>
-              <a:t>24. October 2016</a:t>
+              <a:t>30. October 2016</a:t>
             </a:fld>
             <a:endParaRPr lang="de-DE" dirty="0"/>
           </a:p>
@@ -11324,7 +11327,7 @@
           <a:p>
             <a:fld id="{0EEF625A-31C6-4C43-A417-E21D122C48C9}" type="datetime4">
               <a:rPr lang="de-DE" smtClean="0"/>
-              <a:t>24. October 2016</a:t>
+              <a:t>30. October 2016</a:t>
             </a:fld>
             <a:endParaRPr lang="de-DE" dirty="0"/>
           </a:p>
@@ -11781,7 +11784,7 @@
           <a:p>
             <a:fld id="{3569E491-B4C2-46B6-A237-FACFE3FBE201}" type="datetime4">
               <a:rPr lang="de-DE" smtClean="0"/>
-              <a:t>24. October 2016</a:t>
+              <a:t>30. October 2016</a:t>
             </a:fld>
             <a:endParaRPr lang="de-DE" dirty="0"/>
           </a:p>
@@ -12238,7 +12241,7 @@
           <a:p>
             <a:fld id="{C9B8F62F-A418-41F2-A2B8-0712C2875A78}" type="datetime4">
               <a:rPr lang="de-DE" smtClean="0"/>
-              <a:t>24. October 2016</a:t>
+              <a:t>30. October 2016</a:t>
             </a:fld>
             <a:endParaRPr lang="de-DE" dirty="0"/>
           </a:p>
@@ -12695,7 +12698,7 @@
           <a:p>
             <a:fld id="{0E4A0E54-2F12-40C8-9BEB-C4B6394B4ECD}" type="datetime4">
               <a:rPr lang="de-DE" smtClean="0"/>
-              <a:t>24. October 2016</a:t>
+              <a:t>30. October 2016</a:t>
             </a:fld>
             <a:endParaRPr lang="de-DE" dirty="0"/>
           </a:p>
@@ -13152,7 +13155,7 @@
           <a:p>
             <a:fld id="{EE05A7F5-773C-4881-A0C4-FD42EFE01DC0}" type="datetime4">
               <a:rPr lang="de-DE" smtClean="0"/>
-              <a:t>24. October 2016</a:t>
+              <a:t>30. October 2016</a:t>
             </a:fld>
             <a:endParaRPr lang="de-DE" dirty="0"/>
           </a:p>
@@ -13609,7 +13612,7 @@
           <a:p>
             <a:fld id="{94714CE8-8790-46E3-A6C5-5A488DF231B9}" type="datetime4">
               <a:rPr lang="de-DE" smtClean="0"/>
-              <a:t>24. October 2016</a:t>
+              <a:t>30. October 2016</a:t>
             </a:fld>
             <a:endParaRPr lang="de-DE" dirty="0"/>
           </a:p>
@@ -14066,7 +14069,7 @@
           <a:p>
             <a:fld id="{53E987FC-42D9-453A-9633-2C730DEED79C}" type="datetime4">
               <a:rPr lang="de-DE" smtClean="0"/>
-              <a:t>24. October 2016</a:t>
+              <a:t>30. October 2016</a:t>
             </a:fld>
             <a:endParaRPr lang="de-DE" dirty="0"/>
           </a:p>
@@ -14523,7 +14526,7 @@
           <a:p>
             <a:fld id="{F858E51C-64A7-4E7C-AB35-CFC5B09D3A53}" type="datetime4">
               <a:rPr lang="de-DE" smtClean="0"/>
-              <a:t>24. October 2016</a:t>
+              <a:t>30. October 2016</a:t>
             </a:fld>
             <a:endParaRPr lang="de-DE" dirty="0"/>
           </a:p>
@@ -14987,7 +14990,7 @@
           <a:p>
             <a:fld id="{C7FDC5D2-36A7-438D-9651-EF40CEE3BFF8}" type="datetime4">
               <a:rPr lang="de-DE" smtClean="0"/>
-              <a:t>24. October 2016</a:t>
+              <a:t>30. October 2016</a:t>
             </a:fld>
             <a:endParaRPr lang="de-DE" dirty="0"/>
           </a:p>
@@ -15345,7 +15348,7 @@
           <a:graphicData uri="http://schemas.openxmlformats.org/presentationml/2006/ole">
             <mc:AlternateContent xmlns:mc="http://schemas.openxmlformats.org/markup-compatibility/2006">
               <mc:Choice xmlns:v="urn:schemas-microsoft-com:vml" Requires="v">
-                <p:oleObj spid="_x0000_s4700" name="think-cell Folie" r:id="rId4" imgW="270" imgH="270" progId="TCLayout.ActiveDocument.1">
+                <p:oleObj spid="_x0000_s4704" name="think-cell Folie" r:id="rId4" imgW="270" imgH="270" progId="TCLayout.ActiveDocument.1">
                   <p:embed/>
                 </p:oleObj>
               </mc:Choice>
@@ -15856,7 +15859,7 @@
           <a:p>
             <a:fld id="{C8EDA7CF-0B25-4927-9C0E-D25F75C14022}" type="datetime4">
               <a:rPr lang="de-DE" smtClean="0"/>
-              <a:t>24. October 2016</a:t>
+              <a:t>30. October 2016</a:t>
             </a:fld>
             <a:endParaRPr lang="de-DE" dirty="0"/>
           </a:p>
@@ -16320,7 +16323,7 @@
           <a:p>
             <a:fld id="{01DB4873-AA39-4F92-AC07-5D311AB9735E}" type="datetime4">
               <a:rPr lang="de-DE" smtClean="0"/>
-              <a:t>24. October 2016</a:t>
+              <a:t>30. October 2016</a:t>
             </a:fld>
             <a:endParaRPr lang="de-DE" dirty="0"/>
           </a:p>
@@ -16784,7 +16787,7 @@
           <a:p>
             <a:fld id="{E0E188F9-1BFA-4825-9F8A-513A15D12057}" type="datetime4">
               <a:rPr lang="de-DE" smtClean="0"/>
-              <a:t>24. October 2016</a:t>
+              <a:t>30. October 2016</a:t>
             </a:fld>
             <a:endParaRPr lang="de-DE" dirty="0"/>
           </a:p>
@@ -17248,7 +17251,7 @@
           <a:p>
             <a:fld id="{B7F478BD-39EA-4984-8260-14496EFFC047}" type="datetime4">
               <a:rPr lang="de-DE" smtClean="0"/>
-              <a:t>24. October 2016</a:t>
+              <a:t>30. October 2016</a:t>
             </a:fld>
             <a:endParaRPr lang="de-DE" dirty="0"/>
           </a:p>
@@ -17606,7 +17609,7 @@
           <a:graphicData uri="http://schemas.openxmlformats.org/presentationml/2006/ole">
             <mc:AlternateContent xmlns:mc="http://schemas.openxmlformats.org/markup-compatibility/2006">
               <mc:Choice xmlns:v="urn:schemas-microsoft-com:vml" Requires="v">
-                <p:oleObj spid="_x0000_s5724" name="think-cell Folie" r:id="rId4" imgW="270" imgH="270" progId="TCLayout.ActiveDocument.1">
+                <p:oleObj spid="_x0000_s5728" name="think-cell Folie" r:id="rId4" imgW="270" imgH="270" progId="TCLayout.ActiveDocument.1">
                   <p:embed/>
                 </p:oleObj>
               </mc:Choice>
@@ -18019,7 +18022,7 @@
           <a:graphicData uri="http://schemas.openxmlformats.org/presentationml/2006/ole">
             <mc:AlternateContent xmlns:mc="http://schemas.openxmlformats.org/markup-compatibility/2006">
               <mc:Choice xmlns:v="urn:schemas-microsoft-com:vml" Requires="v">
-                <p:oleObj spid="_x0000_s6748" name="think-cell Folie" r:id="rId4" imgW="270" imgH="270" progId="TCLayout.ActiveDocument.1">
+                <p:oleObj spid="_x0000_s6752" name="think-cell Folie" r:id="rId4" imgW="270" imgH="270" progId="TCLayout.ActiveDocument.1">
                   <p:embed/>
                 </p:oleObj>
               </mc:Choice>
@@ -18246,7 +18249,7 @@
           <a:graphicData uri="http://schemas.openxmlformats.org/presentationml/2006/ole">
             <mc:AlternateContent xmlns:mc="http://schemas.openxmlformats.org/markup-compatibility/2006">
               <mc:Choice xmlns:v="urn:schemas-microsoft-com:vml" Requires="v">
-                <p:oleObj spid="_x0000_s7772" name="think-cell Folie" r:id="rId4" imgW="270" imgH="270" progId="TCLayout.ActiveDocument.1">
+                <p:oleObj spid="_x0000_s7776" name="think-cell Folie" r:id="rId4" imgW="270" imgH="270" progId="TCLayout.ActiveDocument.1">
                   <p:embed/>
                 </p:oleObj>
               </mc:Choice>
@@ -18466,7 +18469,7 @@
           <a:graphicData uri="http://schemas.openxmlformats.org/presentationml/2006/ole">
             <mc:AlternateContent xmlns:mc="http://schemas.openxmlformats.org/markup-compatibility/2006">
               <mc:Choice xmlns:v="urn:schemas-microsoft-com:vml" Requires="v">
-                <p:oleObj spid="_x0000_s8796" name="think-cell Folie" r:id="rId4" imgW="270" imgH="270" progId="TCLayout.ActiveDocument.1">
+                <p:oleObj spid="_x0000_s8800" name="think-cell Folie" r:id="rId4" imgW="270" imgH="270" progId="TCLayout.ActiveDocument.1">
                   <p:embed/>
                 </p:oleObj>
               </mc:Choice>
@@ -18694,7 +18697,7 @@
           <a:graphicData uri="http://schemas.openxmlformats.org/presentationml/2006/ole">
             <mc:AlternateContent xmlns:mc="http://schemas.openxmlformats.org/markup-compatibility/2006">
               <mc:Choice xmlns:v="urn:schemas-microsoft-com:vml" Requires="v">
-                <p:oleObj spid="_x0000_s9820" name="think-cell Folie" r:id="rId4" imgW="270" imgH="270" progId="TCLayout.ActiveDocument.1">
+                <p:oleObj spid="_x0000_s9824" name="think-cell Folie" r:id="rId4" imgW="270" imgH="270" progId="TCLayout.ActiveDocument.1">
                   <p:embed/>
                 </p:oleObj>
               </mc:Choice>
@@ -18958,7 +18961,7 @@
           <a:graphicData uri="http://schemas.openxmlformats.org/presentationml/2006/ole">
             <mc:AlternateContent xmlns:mc="http://schemas.openxmlformats.org/markup-compatibility/2006">
               <mc:Choice xmlns:v="urn:schemas-microsoft-com:vml" Requires="v">
-                <p:oleObj spid="_x0000_s1633" name="think-cell Folie" r:id="rId47" imgW="359" imgH="358" progId="TCLayout.ActiveDocument.1">
+                <p:oleObj spid="_x0000_s1637" name="think-cell Folie" r:id="rId47" imgW="359" imgH="358" progId="TCLayout.ActiveDocument.1">
                   <p:embed/>
                 </p:oleObj>
               </mc:Choice>
@@ -19110,7 +19113,7 @@
           <a:p>
             <a:fld id="{204FF091-6AFD-46C0-A7CF-A8042EB4153F}" type="datetime4">
               <a:rPr lang="de-DE" smtClean="0"/>
-              <a:t>24. October 2016</a:t>
+              <a:t>30. October 2016</a:t>
             </a:fld>
             <a:endParaRPr lang="de-DE"/>
           </a:p>
@@ -19778,6 +19781,53 @@
       </p:grpSpPr>
       <p:sp>
         <p:nvSpPr>
+          <p:cNvPr id="7" name="Rectangle 6"/>
+          <p:cNvSpPr/>
+          <p:nvPr/>
+        </p:nvSpPr>
+        <p:spPr>
+          <a:xfrm>
+            <a:off x="1055823" y="2624920"/>
+            <a:ext cx="9575800" cy="3485402"/>
+          </a:xfrm>
+          <a:prstGeom prst="rect">
+            <a:avLst/>
+          </a:prstGeom>
+          <a:solidFill>
+            <a:schemeClr val="bg1">
+              <a:lumMod val="75000"/>
+            </a:schemeClr>
+          </a:solidFill>
+          <a:ln>
+            <a:noFill/>
+          </a:ln>
+          <a:effectLst/>
+        </p:spPr>
+        <p:style>
+          <a:lnRef idx="1">
+            <a:schemeClr val="accent1"/>
+          </a:lnRef>
+          <a:fillRef idx="3">
+            <a:schemeClr val="accent1"/>
+          </a:fillRef>
+          <a:effectRef idx="2">
+            <a:schemeClr val="accent1"/>
+          </a:effectRef>
+          <a:fontRef idx="minor">
+            <a:schemeClr val="lt1"/>
+          </a:fontRef>
+        </p:style>
+        <p:txBody>
+          <a:bodyPr rtlCol="0" anchor="ctr"/>
+          <a:lstStyle/>
+          <a:p>
+            <a:pPr algn="ctr"/>
+            <a:endParaRPr lang="en-US" dirty="0" err="1" smtClean="0"/>
+          </a:p>
+        </p:txBody>
+      </p:sp>
+      <p:sp>
+        <p:nvSpPr>
           <p:cNvPr id="2" name="Titel 1"/>
           <p:cNvSpPr>
             <a:spLocks noGrp="1"/>
@@ -19831,7 +19881,7 @@
         </p:nvSpPr>
         <p:spPr>
           <a:xfrm>
-            <a:off x="1271430" y="3781758"/>
+            <a:off x="1271430" y="4086558"/>
             <a:ext cx="9144587" cy="768350"/>
           </a:xfrm>
           <a:prstGeom prst="rect">
@@ -19876,7 +19926,7 @@
         </p:nvSpPr>
         <p:spPr>
           <a:xfrm>
-            <a:off x="1271430" y="2776116"/>
+            <a:off x="1271430" y="3080916"/>
             <a:ext cx="9144587" cy="768350"/>
           </a:xfrm>
           <a:prstGeom prst="rect">
@@ -19966,7 +20016,7 @@
         </p:nvSpPr>
         <p:spPr>
           <a:xfrm>
-            <a:off x="1280698" y="4823851"/>
+            <a:off x="1280698" y="5128651"/>
             <a:ext cx="9135320" cy="768350"/>
           </a:xfrm>
           <a:prstGeom prst="rect">
@@ -20011,8 +20061,8 @@
         </p:nvSpPr>
         <p:spPr>
           <a:xfrm>
-            <a:off x="4385818" y="4951994"/>
-            <a:ext cx="1944058" cy="461665"/>
+            <a:off x="4081018" y="5256794"/>
+            <a:ext cx="3005246" cy="461665"/>
           </a:xfrm>
           <a:prstGeom prst="rect">
             <a:avLst/>
@@ -20033,6 +20083,16 @@
                 <a:latin typeface="+mj-lt"/>
                 <a:ea typeface="Cambria Math" panose="02040503050406030204" pitchFamily="18" charset="0"/>
               </a:rPr>
+              <a:t>Cluster </a:t>
+            </a:r>
+            <a:r>
+              <a:rPr lang="de-DE" sz="2400" dirty="0" err="1" smtClean="0">
+                <a:solidFill>
+                  <a:schemeClr val="bg1"/>
+                </a:solidFill>
+                <a:latin typeface="+mj-lt"/>
+                <a:ea typeface="Cambria Math" panose="02040503050406030204" pitchFamily="18" charset="0"/>
+              </a:rPr>
               <a:t>Virtualization</a:t>
             </a:r>
             <a:endParaRPr lang="de-DE" sz="2400" dirty="0">
@@ -20053,7 +20113,7 @@
         </p:nvSpPr>
         <p:spPr>
           <a:xfrm>
-            <a:off x="4040820" y="3925006"/>
+            <a:off x="4040820" y="4229806"/>
             <a:ext cx="2634054" cy="461665"/>
           </a:xfrm>
           <a:prstGeom prst="rect">
@@ -20095,7 +20155,7 @@
         </p:nvSpPr>
         <p:spPr>
           <a:xfrm>
-            <a:off x="4040820" y="2864065"/>
+            <a:off x="4040820" y="3219665"/>
             <a:ext cx="2956259" cy="461665"/>
           </a:xfrm>
           <a:prstGeom prst="rect">
@@ -20147,8 +20207,8 @@
         </p:nvSpPr>
         <p:spPr>
           <a:xfrm>
-            <a:off x="1431224" y="1789030"/>
-            <a:ext cx="3924088" cy="461665"/>
+            <a:off x="1431224" y="1611230"/>
+            <a:ext cx="3924088" cy="830997"/>
           </a:xfrm>
           <a:prstGeom prst="rect">
             <a:avLst/>
@@ -20169,7 +20229,36 @@
                 <a:latin typeface="+mj-lt"/>
                 <a:ea typeface="Cambria Math" panose="02040503050406030204" pitchFamily="18" charset="0"/>
               </a:rPr>
-              <a:t>Cloud Native App </a:t>
+              <a:t>Cloud Native </a:t>
+            </a:r>
+            <a:br>
+              <a:rPr lang="de-DE" sz="2400" dirty="0" smtClean="0">
+                <a:solidFill>
+                  <a:schemeClr val="bg1"/>
+                </a:solidFill>
+                <a:latin typeface="+mj-lt"/>
+                <a:ea typeface="Cambria Math" panose="02040503050406030204" pitchFamily="18" charset="0"/>
+              </a:rPr>
+            </a:br>
+            <a:r>
+              <a:rPr lang="de-DE" sz="2400" dirty="0" err="1" smtClean="0">
+                <a:solidFill>
+                  <a:schemeClr val="bg1"/>
+                </a:solidFill>
+                <a:latin typeface="+mj-lt"/>
+                <a:ea typeface="Cambria Math" panose="02040503050406030204" pitchFamily="18" charset="0"/>
+              </a:rPr>
+              <a:t>Application</a:t>
+            </a:r>
+            <a:r>
+              <a:rPr lang="de-DE" sz="2400" dirty="0" smtClean="0">
+                <a:solidFill>
+                  <a:schemeClr val="bg1"/>
+                </a:solidFill>
+                <a:latin typeface="+mj-lt"/>
+                <a:ea typeface="Cambria Math" panose="02040503050406030204" pitchFamily="18" charset="0"/>
+              </a:rPr>
+              <a:t> </a:t>
             </a:r>
             <a:r>
               <a:rPr lang="de-DE" sz="2400" dirty="0" err="1" smtClean="0">
@@ -20199,8 +20288,8 @@
         </p:nvSpPr>
         <p:spPr>
           <a:xfrm>
-            <a:off x="5518951" y="1798941"/>
-            <a:ext cx="2083544" cy="501805"/>
+            <a:off x="4927600" y="1782823"/>
+            <a:ext cx="2674895" cy="543323"/>
           </a:xfrm>
           <a:prstGeom prst="roundRect">
             <a:avLst/>
@@ -20240,8 +20329,13 @@
                   <a:schemeClr val="tx1"/>
                 </a:solidFill>
               </a:rPr>
-              <a:t>Services</a:t>
-            </a:r>
+              <a:t>Cloud Native App</a:t>
+            </a:r>
+            <a:endParaRPr lang="de-DE" sz="2400" dirty="0" smtClean="0">
+              <a:solidFill>
+                <a:schemeClr val="tx1"/>
+              </a:solidFill>
+            </a:endParaRPr>
           </a:p>
         </p:txBody>
       </p:sp>
@@ -20253,7 +20347,7 @@
         </p:nvSpPr>
         <p:spPr>
           <a:xfrm>
-            <a:off x="8199203" y="2864065"/>
+            <a:off x="8199203" y="3168865"/>
             <a:ext cx="2083544" cy="501805"/>
           </a:xfrm>
           <a:prstGeom prst="roundRect">
@@ -20312,7 +20406,7 @@
         </p:nvSpPr>
         <p:spPr>
           <a:xfrm>
-            <a:off x="8199203" y="3907227"/>
+            <a:off x="8199203" y="4212027"/>
             <a:ext cx="2083544" cy="501805"/>
           </a:xfrm>
           <a:prstGeom prst="roundRect">
@@ -20366,7 +20460,7 @@
         </p:nvSpPr>
         <p:spPr>
           <a:xfrm>
-            <a:off x="8199203" y="4951994"/>
+            <a:off x="8199203" y="5256794"/>
             <a:ext cx="2083544" cy="501805"/>
           </a:xfrm>
           <a:prstGeom prst="roundRect">
@@ -20409,11 +20503,6 @@
               </a:rPr>
               <a:t>Resources</a:t>
             </a:r>
-            <a:endParaRPr lang="de-DE" sz="2400" dirty="0" smtClean="0">
-              <a:solidFill>
-                <a:schemeClr val="tx1"/>
-              </a:solidFill>
-            </a:endParaRPr>
           </a:p>
         </p:txBody>
       </p:sp>
@@ -20477,10 +20566,53 @@
           </a:p>
         </p:txBody>
       </p:sp>
+      <p:sp>
+        <p:nvSpPr>
+          <p:cNvPr id="27" name="Textfeld 14"/>
+          <p:cNvSpPr txBox="1"/>
+          <p:nvPr/>
+        </p:nvSpPr>
+        <p:spPr>
+          <a:xfrm>
+            <a:off x="3761420" y="2584236"/>
+            <a:ext cx="3709670" cy="461665"/>
+          </a:xfrm>
+          <a:prstGeom prst="rect">
+            <a:avLst/>
+          </a:prstGeom>
+          <a:noFill/>
+        </p:spPr>
+        <p:txBody>
+          <a:bodyPr wrap="none" rtlCol="0">
+            <a:spAutoFit/>
+          </a:bodyPr>
+          <a:lstStyle/>
+          <a:p>
+            <a:r>
+              <a:rPr lang="de-DE" sz="2400" dirty="0" smtClean="0">
+                <a:latin typeface="+mj-lt"/>
+                <a:ea typeface="Cambria Math" panose="02040503050406030204" pitchFamily="18" charset="0"/>
+              </a:rPr>
+              <a:t>Cluster </a:t>
+            </a:r>
+            <a:r>
+              <a:rPr lang="de-DE" sz="2400" dirty="0" smtClean="0">
+                <a:latin typeface="+mj-lt"/>
+                <a:ea typeface="Cambria Math" panose="02040503050406030204" pitchFamily="18" charset="0"/>
+              </a:rPr>
+              <a:t>Operating System</a:t>
+            </a:r>
+            <a:endParaRPr lang="de-DE" sz="2400" dirty="0">
+              <a:latin typeface="+mj-lt"/>
+              <a:ea typeface="Cambria Math" panose="02040503050406030204" pitchFamily="18" charset="0"/>
+            </a:endParaRPr>
+          </a:p>
+        </p:txBody>
+      </p:sp>
     </p:spTree>
     <p:extLst>
       <p:ext uri="{BB962C8B-B14F-4D97-AF65-F5344CB8AC3E}">
-        <p14:creationId xmlns:p14="http://schemas.microsoft.com/office/powerpoint/2010/main" val="569446218"/>
+        <p14:creationId xmlns:p14="http://schemas.microsoft.com/office/powerpoint/2010/main" val="642132713"/>
       </p:ext>
     </p:extLst>
   </p:cSld>
@@ -22639,7 +22771,7 @@
       </p:grpSpPr>
       <p:sp>
         <p:nvSpPr>
-          <p:cNvPr id="2" name="Titel 1"/>
+          <p:cNvPr id="2" name="Title 1"/>
           <p:cNvSpPr>
             <a:spLocks noGrp="1"/>
           </p:cNvSpPr>
@@ -22647,27 +22779,22 @@
             <p:ph type="title"/>
           </p:nvPr>
         </p:nvSpPr>
-        <p:spPr>
-          <a:xfrm>
-            <a:off x="4861366" y="344169"/>
-            <a:ext cx="6696225" cy="995362"/>
-          </a:xfrm>
-        </p:spPr>
+        <p:spPr/>
         <p:txBody>
           <a:bodyPr/>
           <a:lstStyle/>
           <a:p>
             <a:r>
-              <a:rPr lang="de-DE" dirty="0" smtClean="0"/>
-              <a:t>GOALS</a:t>
-            </a:r>
-            <a:endParaRPr lang="de-DE" dirty="0"/>
-          </a:p>
-        </p:txBody>
-      </p:sp>
-      <p:sp>
-        <p:nvSpPr>
-          <p:cNvPr id="3" name="Foliennummernplatzhalter 2"/>
+              <a:rPr lang="en-US" dirty="0" smtClean="0"/>
+              <a:t>Sneak Preview: Kubernetes</a:t>
+            </a:r>
+            <a:endParaRPr lang="en-US" dirty="0"/>
+          </a:p>
+        </p:txBody>
+      </p:sp>
+      <p:sp>
+        <p:nvSpPr>
+          <p:cNvPr id="3" name="Slide Number Placeholder 2"/>
           <p:cNvSpPr>
             <a:spLocks noGrp="1"/>
           </p:cNvSpPr>
@@ -22688,333 +22815,10 @@
           </a:p>
         </p:txBody>
       </p:sp>
-      <p:sp>
-        <p:nvSpPr>
-          <p:cNvPr id="4" name="Inhaltsplatzhalter 3"/>
-          <p:cNvSpPr>
-            <a:spLocks noGrp="1"/>
-          </p:cNvSpPr>
-          <p:nvPr>
-            <p:ph sz="quarter" idx="13"/>
-          </p:nvPr>
-        </p:nvSpPr>
-        <p:spPr>
-          <a:xfrm>
-            <a:off x="4861367" y="1753201"/>
-            <a:ext cx="6696226" cy="4759325"/>
-          </a:xfrm>
-        </p:spPr>
-        <p:txBody>
-          <a:bodyPr/>
-          <a:lstStyle/>
-          <a:p>
-            <a:r>
-              <a:rPr lang="de-DE" dirty="0" err="1" smtClean="0"/>
-              <a:t>You</a:t>
-            </a:r>
-            <a:r>
-              <a:rPr lang="de-DE" dirty="0" smtClean="0"/>
-              <a:t> </a:t>
-            </a:r>
-            <a:r>
-              <a:rPr lang="de-DE" dirty="0" err="1" smtClean="0"/>
-              <a:t>are</a:t>
-            </a:r>
-            <a:r>
-              <a:rPr lang="de-DE" dirty="0" smtClean="0"/>
-              <a:t> </a:t>
-            </a:r>
-            <a:r>
-              <a:rPr lang="de-DE" dirty="0" err="1" smtClean="0"/>
-              <a:t>aware</a:t>
-            </a:r>
-            <a:r>
-              <a:rPr lang="de-DE" dirty="0" smtClean="0"/>
-              <a:t> </a:t>
-            </a:r>
-            <a:r>
-              <a:rPr lang="de-DE" dirty="0" err="1" smtClean="0"/>
-              <a:t>of</a:t>
-            </a:r>
-            <a:r>
-              <a:rPr lang="de-DE" dirty="0" smtClean="0"/>
-              <a:t> </a:t>
-            </a:r>
-            <a:r>
-              <a:rPr lang="de-DE" dirty="0" err="1" smtClean="0"/>
-              <a:t>the</a:t>
-            </a:r>
-            <a:r>
-              <a:rPr lang="de-DE" dirty="0" smtClean="0"/>
-              <a:t> </a:t>
-            </a:r>
-            <a:r>
-              <a:rPr lang="de-DE" dirty="0" err="1" smtClean="0"/>
-              <a:t>basic</a:t>
-            </a:r>
-            <a:r>
-              <a:rPr lang="de-DE" dirty="0" smtClean="0"/>
-              <a:t> </a:t>
-            </a:r>
-            <a:r>
-              <a:rPr lang="de-DE" dirty="0" err="1" smtClean="0"/>
-              <a:t>principles</a:t>
-            </a:r>
-            <a:r>
-              <a:rPr lang="de-DE" dirty="0" smtClean="0"/>
-              <a:t> </a:t>
-            </a:r>
-            <a:r>
-              <a:rPr lang="de-DE" dirty="0" err="1" smtClean="0"/>
-              <a:t>of</a:t>
-            </a:r>
-            <a:r>
-              <a:rPr lang="de-DE" dirty="0" smtClean="0"/>
-              <a:t> Cloud Native Computing</a:t>
-            </a:r>
-          </a:p>
-          <a:p>
-            <a:r>
-              <a:rPr lang="de-DE" dirty="0" err="1" smtClean="0"/>
-              <a:t>You</a:t>
-            </a:r>
-            <a:r>
-              <a:rPr lang="de-DE" dirty="0" smtClean="0"/>
-              <a:t> </a:t>
-            </a:r>
-            <a:r>
-              <a:rPr lang="de-DE" dirty="0" err="1" smtClean="0"/>
-              <a:t>know</a:t>
-            </a:r>
-            <a:r>
-              <a:rPr lang="de-DE" dirty="0" smtClean="0"/>
-              <a:t> </a:t>
-            </a:r>
-            <a:r>
-              <a:rPr lang="de-DE" dirty="0" err="1" smtClean="0"/>
-              <a:t>how</a:t>
-            </a:r>
-            <a:r>
-              <a:rPr lang="de-DE" dirty="0" smtClean="0"/>
-              <a:t> </a:t>
-            </a:r>
-            <a:r>
-              <a:rPr lang="de-DE" dirty="0" err="1" smtClean="0"/>
-              <a:t>to</a:t>
-            </a:r>
-            <a:r>
-              <a:rPr lang="de-DE" dirty="0" smtClean="0"/>
-              <a:t> </a:t>
-            </a:r>
-            <a:r>
-              <a:rPr lang="de-DE" dirty="0" err="1" smtClean="0"/>
-              <a:t>use</a:t>
-            </a:r>
-            <a:r>
-              <a:rPr lang="de-DE" dirty="0" smtClean="0"/>
-              <a:t> Docker </a:t>
-            </a:r>
-            <a:r>
-              <a:rPr lang="de-DE" dirty="0" err="1" smtClean="0"/>
-              <a:t>as</a:t>
-            </a:r>
-            <a:r>
-              <a:rPr lang="de-DE" dirty="0" smtClean="0"/>
-              <a:t> a </a:t>
-            </a:r>
-            <a:r>
-              <a:rPr lang="de-DE" dirty="0" err="1" smtClean="0"/>
-              <a:t>Dev</a:t>
-            </a:r>
-            <a:r>
-              <a:rPr lang="de-DE" dirty="0" smtClean="0"/>
-              <a:t> </a:t>
-            </a:r>
-            <a:r>
-              <a:rPr lang="de-DE" dirty="0" err="1" smtClean="0"/>
-              <a:t>guy</a:t>
-            </a:r>
-            <a:endParaRPr lang="de-DE" dirty="0" smtClean="0"/>
-          </a:p>
-          <a:p>
-            <a:r>
-              <a:rPr lang="de-DE" dirty="0" err="1" smtClean="0"/>
-              <a:t>You</a:t>
-            </a:r>
-            <a:r>
-              <a:rPr lang="de-DE" dirty="0" smtClean="0"/>
-              <a:t> </a:t>
-            </a:r>
-            <a:r>
-              <a:rPr lang="de-DE" dirty="0" err="1" smtClean="0"/>
-              <a:t>know</a:t>
-            </a:r>
-            <a:r>
-              <a:rPr lang="de-DE" dirty="0" smtClean="0"/>
-              <a:t> </a:t>
-            </a:r>
-            <a:r>
-              <a:rPr lang="de-DE" dirty="0" err="1" smtClean="0"/>
-              <a:t>how</a:t>
-            </a:r>
-            <a:r>
-              <a:rPr lang="de-DE" dirty="0" smtClean="0"/>
-              <a:t> </a:t>
-            </a:r>
-            <a:r>
-              <a:rPr lang="de-DE" dirty="0" err="1" smtClean="0"/>
-              <a:t>to</a:t>
-            </a:r>
-            <a:r>
-              <a:rPr lang="de-DE" dirty="0" smtClean="0"/>
-              <a:t> </a:t>
-            </a:r>
-            <a:r>
-              <a:rPr lang="de-DE" dirty="0" err="1" smtClean="0"/>
-              <a:t>use</a:t>
-            </a:r>
-            <a:r>
-              <a:rPr lang="de-DE" dirty="0" smtClean="0"/>
-              <a:t> DC/OS </a:t>
-            </a:r>
-            <a:r>
-              <a:rPr lang="de-DE" dirty="0" err="1" smtClean="0"/>
-              <a:t>as</a:t>
-            </a:r>
-            <a:r>
-              <a:rPr lang="de-DE" dirty="0" smtClean="0"/>
-              <a:t> a </a:t>
-            </a:r>
-            <a:r>
-              <a:rPr lang="de-DE" dirty="0" err="1" smtClean="0"/>
-              <a:t>Dev</a:t>
-            </a:r>
-            <a:r>
-              <a:rPr lang="de-DE" dirty="0" smtClean="0"/>
-              <a:t> </a:t>
-            </a:r>
-            <a:r>
-              <a:rPr lang="de-DE" dirty="0" err="1" smtClean="0"/>
-              <a:t>guy</a:t>
-            </a:r>
-            <a:endParaRPr lang="de-DE" dirty="0" smtClean="0"/>
-          </a:p>
-          <a:p>
-            <a:r>
-              <a:rPr lang="de-DE" dirty="0" err="1" smtClean="0"/>
-              <a:t>You</a:t>
-            </a:r>
-            <a:r>
-              <a:rPr lang="de-DE" dirty="0" smtClean="0"/>
-              <a:t> </a:t>
-            </a:r>
-            <a:r>
-              <a:rPr lang="de-DE" dirty="0" err="1" smtClean="0"/>
-              <a:t>basically</a:t>
-            </a:r>
-            <a:r>
-              <a:rPr lang="de-DE" dirty="0" smtClean="0"/>
-              <a:t> </a:t>
-            </a:r>
-            <a:r>
-              <a:rPr lang="de-DE" dirty="0" err="1" smtClean="0"/>
-              <a:t>know</a:t>
-            </a:r>
-            <a:r>
-              <a:rPr lang="de-DE" dirty="0" smtClean="0"/>
-              <a:t> </a:t>
-            </a:r>
-            <a:r>
-              <a:rPr lang="de-DE" dirty="0" err="1" smtClean="0"/>
-              <a:t>how</a:t>
-            </a:r>
-            <a:r>
-              <a:rPr lang="de-DE" dirty="0" smtClean="0"/>
-              <a:t> </a:t>
-            </a:r>
-            <a:r>
-              <a:rPr lang="de-DE" dirty="0" err="1" smtClean="0"/>
-              <a:t>to</a:t>
-            </a:r>
-            <a:r>
-              <a:rPr lang="de-DE" dirty="0" smtClean="0"/>
-              <a:t> </a:t>
-            </a:r>
-            <a:r>
-              <a:rPr lang="de-DE" dirty="0" err="1" smtClean="0"/>
-              <a:t>use</a:t>
-            </a:r>
-            <a:r>
-              <a:rPr lang="de-DE" dirty="0" smtClean="0"/>
-              <a:t> DC/OS </a:t>
-            </a:r>
-            <a:r>
-              <a:rPr lang="de-DE" dirty="0" err="1" smtClean="0"/>
-              <a:t>as</a:t>
-            </a:r>
-            <a:r>
-              <a:rPr lang="de-DE" dirty="0" smtClean="0"/>
-              <a:t> an </a:t>
-            </a:r>
-            <a:r>
-              <a:rPr lang="de-DE" dirty="0" err="1" smtClean="0"/>
-              <a:t>Ops</a:t>
-            </a:r>
-            <a:r>
-              <a:rPr lang="de-DE" dirty="0" smtClean="0"/>
-              <a:t> </a:t>
-            </a:r>
-            <a:r>
-              <a:rPr lang="de-DE" dirty="0" err="1" smtClean="0"/>
-              <a:t>guy</a:t>
-            </a:r>
-            <a:endParaRPr lang="de-DE" dirty="0"/>
-          </a:p>
-        </p:txBody>
-      </p:sp>
-      <p:pic>
-        <p:nvPicPr>
-          <p:cNvPr id="28674" name="Picture 2" descr="http://img.sparknotes.com/content/sparklife/sparktalk/studytipsfromfaye_LargeWide.jpg"/>
-          <p:cNvPicPr>
-            <a:picLocks noChangeAspect="1" noChangeArrowheads="1"/>
-          </p:cNvPicPr>
-          <p:nvPr/>
-        </p:nvPicPr>
-        <p:blipFill rotWithShape="1">
-          <a:blip r:embed="rId2">
-            <a:extLst>
-              <a:ext uri="{28A0092B-C50C-407E-A947-70E740481C1C}">
-                <a14:useLocalDpi xmlns:a14="http://schemas.microsoft.com/office/drawing/2010/main" val="0"/>
-              </a:ext>
-            </a:extLst>
-          </a:blip>
-          <a:srcRect l="47038" r="13286"/>
-          <a:stretch/>
-        </p:blipFill>
-        <p:spPr bwMode="auto">
-          <a:xfrm>
-            <a:off x="0" y="0"/>
-            <a:ext cx="4710896" cy="6677526"/>
-          </a:xfrm>
-          <a:prstGeom prst="rect">
-            <a:avLst/>
-          </a:prstGeom>
-          <a:noFill/>
-          <a:extLst>
-            <a:ext uri="{909E8E84-426E-40DD-AFC4-6F175D3DCCD1}">
-              <a14:hiddenFill xmlns:a14="http://schemas.microsoft.com/office/drawing/2010/main">
-                <a:solidFill>
-                  <a:srgbClr val="FFFFFF"/>
-                </a:solidFill>
-              </a14:hiddenFill>
-            </a:ext>
-          </a:extLst>
-        </p:spPr>
-      </p:pic>
     </p:spTree>
     <p:extLst>
       <p:ext uri="{BB962C8B-B14F-4D97-AF65-F5344CB8AC3E}">
-        <p14:creationId xmlns:p14="http://schemas.microsoft.com/office/powerpoint/2010/main" val="1377347834"/>
+        <p14:creationId xmlns:p14="http://schemas.microsoft.com/office/powerpoint/2010/main" val="1821452194"/>
       </p:ext>
     </p:extLst>
   </p:cSld>
@@ -23029,13 +22833,274 @@
       <p:transition spd="slow"/>
     </mc:Fallback>
   </mc:AlternateContent>
-  <p:timing>
-    <p:tnLst>
-      <p:par>
-        <p:cTn id="1" dur="indefinite" restart="never" nodeType="tmRoot"/>
-      </p:par>
-    </p:tnLst>
-  </p:timing>
+</p:sld>
+</file>
+
+<file path=ppt/slides/slide6.xml><?xml version="1.0" encoding="utf-8"?>
+<p:sld xmlns:a="http://schemas.openxmlformats.org/drawingml/2006/main" xmlns:r="http://schemas.openxmlformats.org/officeDocument/2006/relationships" xmlns:p="http://schemas.openxmlformats.org/presentationml/2006/main">
+  <p:cSld>
+    <p:spTree>
+      <p:nvGrpSpPr>
+        <p:cNvPr id="1" name=""/>
+        <p:cNvGrpSpPr/>
+        <p:nvPr/>
+      </p:nvGrpSpPr>
+      <p:grpSpPr>
+        <a:xfrm>
+          <a:off x="0" y="0"/>
+          <a:ext cx="0" cy="0"/>
+          <a:chOff x="0" y="0"/>
+          <a:chExt cx="0" cy="0"/>
+        </a:xfrm>
+      </p:grpSpPr>
+      <p:sp>
+        <p:nvSpPr>
+          <p:cNvPr id="2" name="Title 1"/>
+          <p:cNvSpPr>
+            <a:spLocks noGrp="1"/>
+          </p:cNvSpPr>
+          <p:nvPr>
+            <p:ph type="title"/>
+          </p:nvPr>
+        </p:nvSpPr>
+        <p:spPr/>
+        <p:txBody>
+          <a:bodyPr/>
+          <a:lstStyle/>
+          <a:p>
+            <a:r>
+              <a:rPr lang="en-US" dirty="0" smtClean="0"/>
+              <a:t>Sneak Preview: </a:t>
+            </a:r>
+            <a:r>
+              <a:rPr lang="en-US" dirty="0" err="1" smtClean="0"/>
+              <a:t>OpenShift</a:t>
+            </a:r>
+            <a:r>
+              <a:rPr lang="en-US" dirty="0" smtClean="0"/>
+              <a:t> v3</a:t>
+            </a:r>
+            <a:endParaRPr lang="en-US" dirty="0"/>
+          </a:p>
+        </p:txBody>
+      </p:sp>
+      <p:sp>
+        <p:nvSpPr>
+          <p:cNvPr id="3" name="Slide Number Placeholder 2"/>
+          <p:cNvSpPr>
+            <a:spLocks noGrp="1"/>
+          </p:cNvSpPr>
+          <p:nvPr>
+            <p:ph type="sldNum" sz="quarter" idx="11"/>
+          </p:nvPr>
+        </p:nvSpPr>
+        <p:spPr/>
+        <p:txBody>
+          <a:bodyPr/>
+          <a:lstStyle/>
+          <a:p>
+            <a:fld id="{213282FB-536A-4491-BC5C-9B3AAEEA56EF}" type="slidenum">
+              <a:rPr lang="de-DE" smtClean="0"/>
+              <a:t>6</a:t>
+            </a:fld>
+            <a:endParaRPr lang="de-DE"/>
+          </a:p>
+        </p:txBody>
+      </p:sp>
+    </p:spTree>
+    <p:extLst>
+      <p:ext uri="{BB962C8B-B14F-4D97-AF65-F5344CB8AC3E}">
+        <p14:creationId xmlns:p14="http://schemas.microsoft.com/office/powerpoint/2010/main" val="1954682925"/>
+      </p:ext>
+    </p:extLst>
+  </p:cSld>
+  <p:clrMapOvr>
+    <a:masterClrMapping/>
+  </p:clrMapOvr>
+  <mc:AlternateContent xmlns:mc="http://schemas.openxmlformats.org/markup-compatibility/2006" xmlns:p14="http://schemas.microsoft.com/office/powerpoint/2010/main">
+    <mc:Choice Requires="p14">
+      <p:transition spd="slow" p14:dur="2000"/>
+    </mc:Choice>
+    <mc:Fallback xmlns="">
+      <p:transition spd="slow"/>
+    </mc:Fallback>
+  </mc:AlternateContent>
+</p:sld>
+</file>
+
+<file path=ppt/slides/slide7.xml><?xml version="1.0" encoding="utf-8"?>
+<p:sld xmlns:a="http://schemas.openxmlformats.org/drawingml/2006/main" xmlns:r="http://schemas.openxmlformats.org/officeDocument/2006/relationships" xmlns:p="http://schemas.openxmlformats.org/presentationml/2006/main">
+  <p:cSld>
+    <p:spTree>
+      <p:nvGrpSpPr>
+        <p:cNvPr id="1" name=""/>
+        <p:cNvGrpSpPr/>
+        <p:nvPr/>
+      </p:nvGrpSpPr>
+      <p:grpSpPr>
+        <a:xfrm>
+          <a:off x="0" y="0"/>
+          <a:ext cx="0" cy="0"/>
+          <a:chOff x="0" y="0"/>
+          <a:chExt cx="0" cy="0"/>
+        </a:xfrm>
+      </p:grpSpPr>
+      <p:sp>
+        <p:nvSpPr>
+          <p:cNvPr id="2" name="Title 1"/>
+          <p:cNvSpPr>
+            <a:spLocks noGrp="1"/>
+          </p:cNvSpPr>
+          <p:nvPr>
+            <p:ph type="title"/>
+          </p:nvPr>
+        </p:nvSpPr>
+        <p:spPr/>
+        <p:txBody>
+          <a:bodyPr/>
+          <a:lstStyle/>
+          <a:p>
+            <a:r>
+              <a:rPr lang="en-US" dirty="0" smtClean="0"/>
+              <a:t>Sneak Preview: </a:t>
+            </a:r>
+            <a:r>
+              <a:rPr lang="en-US" dirty="0" err="1" smtClean="0"/>
+              <a:t>Kontena</a:t>
+            </a:r>
+            <a:endParaRPr lang="en-US" dirty="0"/>
+          </a:p>
+        </p:txBody>
+      </p:sp>
+      <p:sp>
+        <p:nvSpPr>
+          <p:cNvPr id="3" name="Slide Number Placeholder 2"/>
+          <p:cNvSpPr>
+            <a:spLocks noGrp="1"/>
+          </p:cNvSpPr>
+          <p:nvPr>
+            <p:ph type="sldNum" sz="quarter" idx="11"/>
+          </p:nvPr>
+        </p:nvSpPr>
+        <p:spPr/>
+        <p:txBody>
+          <a:bodyPr/>
+          <a:lstStyle/>
+          <a:p>
+            <a:fld id="{213282FB-536A-4491-BC5C-9B3AAEEA56EF}" type="slidenum">
+              <a:rPr lang="de-DE" smtClean="0"/>
+              <a:t>7</a:t>
+            </a:fld>
+            <a:endParaRPr lang="de-DE"/>
+          </a:p>
+        </p:txBody>
+      </p:sp>
+    </p:spTree>
+    <p:extLst>
+      <p:ext uri="{BB962C8B-B14F-4D97-AF65-F5344CB8AC3E}">
+        <p14:creationId xmlns:p14="http://schemas.microsoft.com/office/powerpoint/2010/main" val="151088669"/>
+      </p:ext>
+    </p:extLst>
+  </p:cSld>
+  <p:clrMapOvr>
+    <a:masterClrMapping/>
+  </p:clrMapOvr>
+  <mc:AlternateContent xmlns:mc="http://schemas.openxmlformats.org/markup-compatibility/2006" xmlns:p14="http://schemas.microsoft.com/office/powerpoint/2010/main">
+    <mc:Choice Requires="p14">
+      <p:transition spd="slow" p14:dur="2000"/>
+    </mc:Choice>
+    <mc:Fallback xmlns="">
+      <p:transition spd="slow"/>
+    </mc:Fallback>
+  </mc:AlternateContent>
+</p:sld>
+</file>
+
+<file path=ppt/slides/slide8.xml><?xml version="1.0" encoding="utf-8"?>
+<p:sld xmlns:a="http://schemas.openxmlformats.org/drawingml/2006/main" xmlns:r="http://schemas.openxmlformats.org/officeDocument/2006/relationships" xmlns:p="http://schemas.openxmlformats.org/presentationml/2006/main">
+  <p:cSld>
+    <p:spTree>
+      <p:nvGrpSpPr>
+        <p:cNvPr id="1" name=""/>
+        <p:cNvGrpSpPr/>
+        <p:nvPr/>
+      </p:nvGrpSpPr>
+      <p:grpSpPr>
+        <a:xfrm>
+          <a:off x="0" y="0"/>
+          <a:ext cx="0" cy="0"/>
+          <a:chOff x="0" y="0"/>
+          <a:chExt cx="0" cy="0"/>
+        </a:xfrm>
+      </p:grpSpPr>
+      <p:sp>
+        <p:nvSpPr>
+          <p:cNvPr id="2" name="Title 1"/>
+          <p:cNvSpPr>
+            <a:spLocks noGrp="1"/>
+          </p:cNvSpPr>
+          <p:nvPr>
+            <p:ph type="title"/>
+          </p:nvPr>
+        </p:nvSpPr>
+        <p:spPr/>
+        <p:txBody>
+          <a:bodyPr/>
+          <a:lstStyle/>
+          <a:p>
+            <a:r>
+              <a:rPr lang="en-US" dirty="0" smtClean="0"/>
+              <a:t>Sneak Preview</a:t>
+            </a:r>
+            <a:r>
+              <a:rPr lang="en-US" smtClean="0"/>
+              <a:t>: Gestalt</a:t>
+            </a:r>
+            <a:endParaRPr lang="en-US" dirty="0"/>
+          </a:p>
+        </p:txBody>
+      </p:sp>
+      <p:sp>
+        <p:nvSpPr>
+          <p:cNvPr id="3" name="Slide Number Placeholder 2"/>
+          <p:cNvSpPr>
+            <a:spLocks noGrp="1"/>
+          </p:cNvSpPr>
+          <p:nvPr>
+            <p:ph type="sldNum" sz="quarter" idx="11"/>
+          </p:nvPr>
+        </p:nvSpPr>
+        <p:spPr/>
+        <p:txBody>
+          <a:bodyPr/>
+          <a:lstStyle/>
+          <a:p>
+            <a:fld id="{213282FB-536A-4491-BC5C-9B3AAEEA56EF}" type="slidenum">
+              <a:rPr lang="de-DE" smtClean="0"/>
+              <a:t>8</a:t>
+            </a:fld>
+            <a:endParaRPr lang="de-DE"/>
+          </a:p>
+        </p:txBody>
+      </p:sp>
+    </p:spTree>
+    <p:extLst>
+      <p:ext uri="{BB962C8B-B14F-4D97-AF65-F5344CB8AC3E}">
+        <p14:creationId xmlns:p14="http://schemas.microsoft.com/office/powerpoint/2010/main" val="716733338"/>
+      </p:ext>
+    </p:extLst>
+  </p:cSld>
+  <p:clrMapOvr>
+    <a:masterClrMapping/>
+  </p:clrMapOvr>
+  <mc:AlternateContent xmlns:mc="http://schemas.openxmlformats.org/markup-compatibility/2006" xmlns:p14="http://schemas.microsoft.com/office/powerpoint/2010/main">
+    <mc:Choice Requires="p14">
+      <p:transition spd="slow" p14:dur="2000"/>
+    </mc:Choice>
+    <mc:Fallback xmlns="">
+      <p:transition spd="slow"/>
+    </mc:Fallback>
+  </mc:AlternateContent>
 </p:sld>
 </file>
 

</xml_diff>

<commit_message>
Updated slides - v0.8
</commit_message>
<xml_diff>
--- a/slides/05-summary.pptx
+++ b/slides/05-summary.pptx
@@ -12,13 +12,13 @@
   </p:handoutMasterIdLst>
   <p:sldIdLst>
     <p:sldId id="435" r:id="rId2"/>
-    <p:sldId id="444" r:id="rId3"/>
-    <p:sldId id="441" r:id="rId4"/>
-    <p:sldId id="437" r:id="rId5"/>
-    <p:sldId id="445" r:id="rId6"/>
-    <p:sldId id="446" r:id="rId7"/>
-    <p:sldId id="447" r:id="rId8"/>
-    <p:sldId id="448" r:id="rId9"/>
+    <p:sldId id="441" r:id="rId3"/>
+    <p:sldId id="437" r:id="rId4"/>
+    <p:sldId id="445" r:id="rId5"/>
+    <p:sldId id="446" r:id="rId6"/>
+    <p:sldId id="447" r:id="rId7"/>
+    <p:sldId id="448" r:id="rId8"/>
+    <p:sldId id="449" r:id="rId9"/>
   </p:sldIdLst>
   <p:sldSz cx="12192000" cy="6858000"/>
   <p:notesSz cx="6858000" cy="9144000"/>
@@ -207,7 +207,7 @@
           <a:p>
             <a:fld id="{A07BA2DA-643A-463C-866E-F35E694B91DA}" type="datetimeFigureOut">
               <a:rPr lang="de-DE" smtClean="0"/>
-              <a:t>30.10.16</a:t>
+              <a:t>31.10.16</a:t>
             </a:fld>
             <a:endParaRPr lang="de-DE"/>
           </a:p>
@@ -373,7 +373,7 @@
           <a:p>
             <a:fld id="{77CDB449-486F-456A-B109-598711D3768F}" type="datetimeFigureOut">
               <a:rPr lang="de-DE" smtClean="0"/>
-              <a:t>30.10.16</a:t>
+              <a:t>31.10.16</a:t>
             </a:fld>
             <a:endParaRPr lang="de-DE"/>
           </a:p>
@@ -1154,7 +1154,7 @@
           <a:p>
             <a:fld id="{7F2FE8F5-41A3-4301-A47F-31831316DC49}" type="datetime4">
               <a:rPr lang="de-DE" smtClean="0"/>
-              <a:t>30. October 2016</a:t>
+              <a:t>31. October 2016</a:t>
             </a:fld>
             <a:endParaRPr lang="de-DE"/>
           </a:p>
@@ -1367,7 +1367,7 @@
           <a:p>
             <a:fld id="{47F9C7B1-2EC2-4381-AE6A-D48C16AF6BB3}" type="datetime4">
               <a:rPr lang="de-DE" smtClean="0"/>
-              <a:t>30. October 2016</a:t>
+              <a:t>31. October 2016</a:t>
             </a:fld>
             <a:endParaRPr lang="de-DE" dirty="0"/>
           </a:p>
@@ -1824,7 +1824,7 @@
           <a:p>
             <a:fld id="{5EDDF41F-C0CD-4D6D-B1B8-371D59A6A595}" type="datetime4">
               <a:rPr lang="de-DE" smtClean="0"/>
-              <a:t>30. October 2016</a:t>
+              <a:t>31. October 2016</a:t>
             </a:fld>
             <a:endParaRPr lang="de-DE" dirty="0"/>
           </a:p>
@@ -2281,7 +2281,7 @@
           <a:p>
             <a:fld id="{6BF642D4-A5D5-48EB-8816-07EBA5FFB1EE}" type="datetime4">
               <a:rPr lang="de-DE" smtClean="0"/>
-              <a:t>30. October 2016</a:t>
+              <a:t>31. October 2016</a:t>
             </a:fld>
             <a:endParaRPr lang="de-DE" dirty="0"/>
           </a:p>
@@ -2738,7 +2738,7 @@
           <a:p>
             <a:fld id="{B11C4843-1809-40E5-8578-E03375F47FBB}" type="datetime4">
               <a:rPr lang="de-DE" smtClean="0"/>
-              <a:t>30. October 2016</a:t>
+              <a:t>31. October 2016</a:t>
             </a:fld>
             <a:endParaRPr lang="de-DE" dirty="0"/>
           </a:p>
@@ -3195,7 +3195,7 @@
           <a:p>
             <a:fld id="{883A4E86-E105-42C2-BFCD-87B6057E2C9B}" type="datetime4">
               <a:rPr lang="de-DE" smtClean="0"/>
-              <a:t>30. October 2016</a:t>
+              <a:t>31. October 2016</a:t>
             </a:fld>
             <a:endParaRPr lang="de-DE" dirty="0"/>
           </a:p>
@@ -3652,7 +3652,7 @@
           <a:p>
             <a:fld id="{627DAB0F-5D0B-4037-9758-854518C8BB94}" type="datetime4">
               <a:rPr lang="de-DE" smtClean="0"/>
-              <a:t>30. October 2016</a:t>
+              <a:t>31. October 2016</a:t>
             </a:fld>
             <a:endParaRPr lang="de-DE" dirty="0"/>
           </a:p>
@@ -4109,7 +4109,7 @@
           <a:p>
             <a:fld id="{ADB60C92-C9DA-4155-9A8C-48BE6E179608}" type="datetime4">
               <a:rPr lang="de-DE" smtClean="0"/>
-              <a:t>30. October 2016</a:t>
+              <a:t>31. October 2016</a:t>
             </a:fld>
             <a:endParaRPr lang="de-DE" dirty="0"/>
           </a:p>
@@ -4566,7 +4566,7 @@
           <a:p>
             <a:fld id="{8135CF49-9A73-47A7-8F65-8E7E92988D2A}" type="datetime4">
               <a:rPr lang="de-DE" smtClean="0"/>
-              <a:t>30. October 2016</a:t>
+              <a:t>31. October 2016</a:t>
             </a:fld>
             <a:endParaRPr lang="de-DE" dirty="0"/>
           </a:p>
@@ -5023,7 +5023,7 @@
           <a:p>
             <a:fld id="{76224FF2-59FA-4BA9-B22B-606D9A3E51CA}" type="datetime4">
               <a:rPr lang="de-DE" smtClean="0"/>
-              <a:t>30. October 2016</a:t>
+              <a:t>31. October 2016</a:t>
             </a:fld>
             <a:endParaRPr lang="de-DE" dirty="0"/>
           </a:p>
@@ -5374,7 +5374,7 @@
           <a:graphicData uri="http://schemas.openxmlformats.org/presentationml/2006/ole">
             <mc:AlternateContent xmlns:mc="http://schemas.openxmlformats.org/markup-compatibility/2006">
               <mc:Choice xmlns:v="urn:schemas-microsoft-com:vml" Requires="v">
-                <p:oleObj spid="_x0000_s2657" name="think-cell Folie" r:id="rId4" imgW="270" imgH="270" progId="TCLayout.ActiveDocument.1">
+                <p:oleObj spid="_x0000_s2668" name="think-cell Folie" r:id="rId4" imgW="270" imgH="270" progId="TCLayout.ActiveDocument.1">
                   <p:embed/>
                 </p:oleObj>
               </mc:Choice>
@@ -5895,7 +5895,7 @@
           <a:p>
             <a:fld id="{EA1FED02-8F29-43DF-99E3-E0A5929004FF}" type="datetime4">
               <a:rPr lang="de-DE" smtClean="0"/>
-              <a:t>30. October 2016</a:t>
+              <a:t>31. October 2016</a:t>
             </a:fld>
             <a:endParaRPr lang="de-DE" dirty="0"/>
           </a:p>
@@ -6352,7 +6352,7 @@
           <a:p>
             <a:fld id="{0AB9FDA6-75A4-4AC5-A518-6C4F5DCE22DA}" type="datetime4">
               <a:rPr lang="de-DE" smtClean="0"/>
-              <a:t>30. October 2016</a:t>
+              <a:t>31. October 2016</a:t>
             </a:fld>
             <a:endParaRPr lang="de-DE" dirty="0"/>
           </a:p>
@@ -6809,7 +6809,7 @@
           <a:p>
             <a:fld id="{91D29804-6381-442D-8431-54AF06AA6573}" type="datetime4">
               <a:rPr lang="de-DE" smtClean="0"/>
-              <a:t>30. October 2016</a:t>
+              <a:t>31. October 2016</a:t>
             </a:fld>
             <a:endParaRPr lang="de-DE" dirty="0"/>
           </a:p>
@@ -7266,7 +7266,7 @@
           <a:p>
             <a:fld id="{4475A12F-773D-40F3-975C-324319C18717}" type="datetime4">
               <a:rPr lang="de-DE" smtClean="0"/>
-              <a:t>30. October 2016</a:t>
+              <a:t>31. October 2016</a:t>
             </a:fld>
             <a:endParaRPr lang="de-DE" dirty="0"/>
           </a:p>
@@ -7723,7 +7723,7 @@
           <a:p>
             <a:fld id="{4CA68869-28F7-4FC2-8022-69F8909D12EE}" type="datetime4">
               <a:rPr lang="de-DE" smtClean="0"/>
-              <a:t>30. October 2016</a:t>
+              <a:t>31. October 2016</a:t>
             </a:fld>
             <a:endParaRPr lang="de-DE" dirty="0"/>
           </a:p>
@@ -8180,7 +8180,7 @@
           <a:p>
             <a:fld id="{9D26D645-7457-46F8-A8FF-6A879952E15F}" type="datetime4">
               <a:rPr lang="de-DE" smtClean="0"/>
-              <a:t>30. October 2016</a:t>
+              <a:t>31. October 2016</a:t>
             </a:fld>
             <a:endParaRPr lang="de-DE" dirty="0"/>
           </a:p>
@@ -8637,7 +8637,7 @@
           <a:p>
             <a:fld id="{FC080181-388A-463F-B5F5-A0B0BA591070}" type="datetime4">
               <a:rPr lang="de-DE" smtClean="0"/>
-              <a:t>30. October 2016</a:t>
+              <a:t>31. October 2016</a:t>
             </a:fld>
             <a:endParaRPr lang="de-DE" dirty="0"/>
           </a:p>
@@ -9094,7 +9094,7 @@
           <a:p>
             <a:fld id="{CD65EB56-45A2-4D1A-9B6C-55DE4D0EDF5A}" type="datetime4">
               <a:rPr lang="de-DE" smtClean="0"/>
-              <a:t>30. October 2016</a:t>
+              <a:t>31. October 2016</a:t>
             </a:fld>
             <a:endParaRPr lang="de-DE" dirty="0"/>
           </a:p>
@@ -9551,7 +9551,7 @@
           <a:p>
             <a:fld id="{0DAF41A4-9F3F-4224-A411-7368417F9465}" type="datetime4">
               <a:rPr lang="de-DE" smtClean="0"/>
-              <a:t>30. October 2016</a:t>
+              <a:t>31. October 2016</a:t>
             </a:fld>
             <a:endParaRPr lang="de-DE" dirty="0"/>
           </a:p>
@@ -10008,7 +10008,7 @@
           <a:p>
             <a:fld id="{6D5FE5AD-E500-4D34-9E44-6DC9EBD25FB2}" type="datetime4">
               <a:rPr lang="de-DE" smtClean="0"/>
-              <a:t>30. October 2016</a:t>
+              <a:t>31. October 2016</a:t>
             </a:fld>
             <a:endParaRPr lang="de-DE" dirty="0"/>
           </a:p>
@@ -10359,7 +10359,7 @@
           <a:graphicData uri="http://schemas.openxmlformats.org/presentationml/2006/ole">
             <mc:AlternateContent xmlns:mc="http://schemas.openxmlformats.org/markup-compatibility/2006">
               <mc:Choice xmlns:v="urn:schemas-microsoft-com:vml" Requires="v">
-                <p:oleObj spid="_x0000_s3680" name="think-cell Folie" r:id="rId4" imgW="270" imgH="270" progId="TCLayout.ActiveDocument.1">
+                <p:oleObj spid="_x0000_s3691" name="think-cell Folie" r:id="rId4" imgW="270" imgH="270" progId="TCLayout.ActiveDocument.1">
                   <p:embed/>
                 </p:oleObj>
               </mc:Choice>
@@ -10870,7 +10870,7 @@
           <a:p>
             <a:fld id="{54235FCF-D5BC-44C9-B9DE-48EFF4593A2D}" type="datetime4">
               <a:rPr lang="de-DE" smtClean="0"/>
-              <a:t>30. October 2016</a:t>
+              <a:t>31. October 2016</a:t>
             </a:fld>
             <a:endParaRPr lang="de-DE" dirty="0"/>
           </a:p>
@@ -11327,7 +11327,7 @@
           <a:p>
             <a:fld id="{0EEF625A-31C6-4C43-A417-E21D122C48C9}" type="datetime4">
               <a:rPr lang="de-DE" smtClean="0"/>
-              <a:t>30. October 2016</a:t>
+              <a:t>31. October 2016</a:t>
             </a:fld>
             <a:endParaRPr lang="de-DE" dirty="0"/>
           </a:p>
@@ -11784,7 +11784,7 @@
           <a:p>
             <a:fld id="{3569E491-B4C2-46B6-A237-FACFE3FBE201}" type="datetime4">
               <a:rPr lang="de-DE" smtClean="0"/>
-              <a:t>30. October 2016</a:t>
+              <a:t>31. October 2016</a:t>
             </a:fld>
             <a:endParaRPr lang="de-DE" dirty="0"/>
           </a:p>
@@ -12241,7 +12241,7 @@
           <a:p>
             <a:fld id="{C9B8F62F-A418-41F2-A2B8-0712C2875A78}" type="datetime4">
               <a:rPr lang="de-DE" smtClean="0"/>
-              <a:t>30. October 2016</a:t>
+              <a:t>31. October 2016</a:t>
             </a:fld>
             <a:endParaRPr lang="de-DE" dirty="0"/>
           </a:p>
@@ -12698,7 +12698,7 @@
           <a:p>
             <a:fld id="{0E4A0E54-2F12-40C8-9BEB-C4B6394B4ECD}" type="datetime4">
               <a:rPr lang="de-DE" smtClean="0"/>
-              <a:t>30. October 2016</a:t>
+              <a:t>31. October 2016</a:t>
             </a:fld>
             <a:endParaRPr lang="de-DE" dirty="0"/>
           </a:p>
@@ -13155,7 +13155,7 @@
           <a:p>
             <a:fld id="{EE05A7F5-773C-4881-A0C4-FD42EFE01DC0}" type="datetime4">
               <a:rPr lang="de-DE" smtClean="0"/>
-              <a:t>30. October 2016</a:t>
+              <a:t>31. October 2016</a:t>
             </a:fld>
             <a:endParaRPr lang="de-DE" dirty="0"/>
           </a:p>
@@ -13612,7 +13612,7 @@
           <a:p>
             <a:fld id="{94714CE8-8790-46E3-A6C5-5A488DF231B9}" type="datetime4">
               <a:rPr lang="de-DE" smtClean="0"/>
-              <a:t>30. October 2016</a:t>
+              <a:t>31. October 2016</a:t>
             </a:fld>
             <a:endParaRPr lang="de-DE" dirty="0"/>
           </a:p>
@@ -14069,7 +14069,7 @@
           <a:p>
             <a:fld id="{53E987FC-42D9-453A-9633-2C730DEED79C}" type="datetime4">
               <a:rPr lang="de-DE" smtClean="0"/>
-              <a:t>30. October 2016</a:t>
+              <a:t>31. October 2016</a:t>
             </a:fld>
             <a:endParaRPr lang="de-DE" dirty="0"/>
           </a:p>
@@ -14526,7 +14526,7 @@
           <a:p>
             <a:fld id="{F858E51C-64A7-4E7C-AB35-CFC5B09D3A53}" type="datetime4">
               <a:rPr lang="de-DE" smtClean="0"/>
-              <a:t>30. October 2016</a:t>
+              <a:t>31. October 2016</a:t>
             </a:fld>
             <a:endParaRPr lang="de-DE" dirty="0"/>
           </a:p>
@@ -14990,7 +14990,7 @@
           <a:p>
             <a:fld id="{C7FDC5D2-36A7-438D-9651-EF40CEE3BFF8}" type="datetime4">
               <a:rPr lang="de-DE" smtClean="0"/>
-              <a:t>30. October 2016</a:t>
+              <a:t>31. October 2016</a:t>
             </a:fld>
             <a:endParaRPr lang="de-DE" dirty="0"/>
           </a:p>
@@ -15348,7 +15348,7 @@
           <a:graphicData uri="http://schemas.openxmlformats.org/presentationml/2006/ole">
             <mc:AlternateContent xmlns:mc="http://schemas.openxmlformats.org/markup-compatibility/2006">
               <mc:Choice xmlns:v="urn:schemas-microsoft-com:vml" Requires="v">
-                <p:oleObj spid="_x0000_s4704" name="think-cell Folie" r:id="rId4" imgW="270" imgH="270" progId="TCLayout.ActiveDocument.1">
+                <p:oleObj spid="_x0000_s4715" name="think-cell Folie" r:id="rId4" imgW="270" imgH="270" progId="TCLayout.ActiveDocument.1">
                   <p:embed/>
                 </p:oleObj>
               </mc:Choice>
@@ -15859,7 +15859,7 @@
           <a:p>
             <a:fld id="{C8EDA7CF-0B25-4927-9C0E-D25F75C14022}" type="datetime4">
               <a:rPr lang="de-DE" smtClean="0"/>
-              <a:t>30. October 2016</a:t>
+              <a:t>31. October 2016</a:t>
             </a:fld>
             <a:endParaRPr lang="de-DE" dirty="0"/>
           </a:p>
@@ -16323,7 +16323,7 @@
           <a:p>
             <a:fld id="{01DB4873-AA39-4F92-AC07-5D311AB9735E}" type="datetime4">
               <a:rPr lang="de-DE" smtClean="0"/>
-              <a:t>30. October 2016</a:t>
+              <a:t>31. October 2016</a:t>
             </a:fld>
             <a:endParaRPr lang="de-DE" dirty="0"/>
           </a:p>
@@ -16787,7 +16787,7 @@
           <a:p>
             <a:fld id="{E0E188F9-1BFA-4825-9F8A-513A15D12057}" type="datetime4">
               <a:rPr lang="de-DE" smtClean="0"/>
-              <a:t>30. October 2016</a:t>
+              <a:t>31. October 2016</a:t>
             </a:fld>
             <a:endParaRPr lang="de-DE" dirty="0"/>
           </a:p>
@@ -17251,7 +17251,7 @@
           <a:p>
             <a:fld id="{B7F478BD-39EA-4984-8260-14496EFFC047}" type="datetime4">
               <a:rPr lang="de-DE" smtClean="0"/>
-              <a:t>30. October 2016</a:t>
+              <a:t>31. October 2016</a:t>
             </a:fld>
             <a:endParaRPr lang="de-DE" dirty="0"/>
           </a:p>
@@ -17609,7 +17609,7 @@
           <a:graphicData uri="http://schemas.openxmlformats.org/presentationml/2006/ole">
             <mc:AlternateContent xmlns:mc="http://schemas.openxmlformats.org/markup-compatibility/2006">
               <mc:Choice xmlns:v="urn:schemas-microsoft-com:vml" Requires="v">
-                <p:oleObj spid="_x0000_s5728" name="think-cell Folie" r:id="rId4" imgW="270" imgH="270" progId="TCLayout.ActiveDocument.1">
+                <p:oleObj spid="_x0000_s5739" name="think-cell Folie" r:id="rId4" imgW="270" imgH="270" progId="TCLayout.ActiveDocument.1">
                   <p:embed/>
                 </p:oleObj>
               </mc:Choice>
@@ -18022,7 +18022,7 @@
           <a:graphicData uri="http://schemas.openxmlformats.org/presentationml/2006/ole">
             <mc:AlternateContent xmlns:mc="http://schemas.openxmlformats.org/markup-compatibility/2006">
               <mc:Choice xmlns:v="urn:schemas-microsoft-com:vml" Requires="v">
-                <p:oleObj spid="_x0000_s6752" name="think-cell Folie" r:id="rId4" imgW="270" imgH="270" progId="TCLayout.ActiveDocument.1">
+                <p:oleObj spid="_x0000_s6763" name="think-cell Folie" r:id="rId4" imgW="270" imgH="270" progId="TCLayout.ActiveDocument.1">
                   <p:embed/>
                 </p:oleObj>
               </mc:Choice>
@@ -18249,7 +18249,7 @@
           <a:graphicData uri="http://schemas.openxmlformats.org/presentationml/2006/ole">
             <mc:AlternateContent xmlns:mc="http://schemas.openxmlformats.org/markup-compatibility/2006">
               <mc:Choice xmlns:v="urn:schemas-microsoft-com:vml" Requires="v">
-                <p:oleObj spid="_x0000_s7776" name="think-cell Folie" r:id="rId4" imgW="270" imgH="270" progId="TCLayout.ActiveDocument.1">
+                <p:oleObj spid="_x0000_s7787" name="think-cell Folie" r:id="rId4" imgW="270" imgH="270" progId="TCLayout.ActiveDocument.1">
                   <p:embed/>
                 </p:oleObj>
               </mc:Choice>
@@ -18469,7 +18469,7 @@
           <a:graphicData uri="http://schemas.openxmlformats.org/presentationml/2006/ole">
             <mc:AlternateContent xmlns:mc="http://schemas.openxmlformats.org/markup-compatibility/2006">
               <mc:Choice xmlns:v="urn:schemas-microsoft-com:vml" Requires="v">
-                <p:oleObj spid="_x0000_s8800" name="think-cell Folie" r:id="rId4" imgW="270" imgH="270" progId="TCLayout.ActiveDocument.1">
+                <p:oleObj spid="_x0000_s8811" name="think-cell Folie" r:id="rId4" imgW="270" imgH="270" progId="TCLayout.ActiveDocument.1">
                   <p:embed/>
                 </p:oleObj>
               </mc:Choice>
@@ -18697,7 +18697,7 @@
           <a:graphicData uri="http://schemas.openxmlformats.org/presentationml/2006/ole">
             <mc:AlternateContent xmlns:mc="http://schemas.openxmlformats.org/markup-compatibility/2006">
               <mc:Choice xmlns:v="urn:schemas-microsoft-com:vml" Requires="v">
-                <p:oleObj spid="_x0000_s9824" name="think-cell Folie" r:id="rId4" imgW="270" imgH="270" progId="TCLayout.ActiveDocument.1">
+                <p:oleObj spid="_x0000_s9835" name="think-cell Folie" r:id="rId4" imgW="270" imgH="270" progId="TCLayout.ActiveDocument.1">
                   <p:embed/>
                 </p:oleObj>
               </mc:Choice>
@@ -18961,7 +18961,7 @@
           <a:graphicData uri="http://schemas.openxmlformats.org/presentationml/2006/ole">
             <mc:AlternateContent xmlns:mc="http://schemas.openxmlformats.org/markup-compatibility/2006">
               <mc:Choice xmlns:v="urn:schemas-microsoft-com:vml" Requires="v">
-                <p:oleObj spid="_x0000_s1637" name="think-cell Folie" r:id="rId47" imgW="359" imgH="358" progId="TCLayout.ActiveDocument.1">
+                <p:oleObj spid="_x0000_s1648" name="think-cell Folie" r:id="rId47" imgW="359" imgH="358" progId="TCLayout.ActiveDocument.1">
                   <p:embed/>
                 </p:oleObj>
               </mc:Choice>
@@ -19113,7 +19113,7 @@
           <a:p>
             <a:fld id="{204FF091-6AFD-46C0-A7CF-A8042EB4153F}" type="datetime4">
               <a:rPr lang="de-DE" smtClean="0"/>
-              <a:t>30. October 2016</a:t>
+              <a:t>31. October 2016</a:t>
             </a:fld>
             <a:endParaRPr lang="de-DE"/>
           </a:p>
@@ -19763,881 +19763,6 @@
 </file>
 
 <file path=ppt/slides/slide2.xml><?xml version="1.0" encoding="utf-8"?>
-<p:sld xmlns:a="http://schemas.openxmlformats.org/drawingml/2006/main" xmlns:r="http://schemas.openxmlformats.org/officeDocument/2006/relationships" xmlns:p="http://schemas.openxmlformats.org/presentationml/2006/main">
-  <p:cSld>
-    <p:spTree>
-      <p:nvGrpSpPr>
-        <p:cNvPr id="1" name=""/>
-        <p:cNvGrpSpPr/>
-        <p:nvPr/>
-      </p:nvGrpSpPr>
-      <p:grpSpPr>
-        <a:xfrm>
-          <a:off x="0" y="0"/>
-          <a:ext cx="0" cy="0"/>
-          <a:chOff x="0" y="0"/>
-          <a:chExt cx="0" cy="0"/>
-        </a:xfrm>
-      </p:grpSpPr>
-      <p:sp>
-        <p:nvSpPr>
-          <p:cNvPr id="7" name="Rectangle 6"/>
-          <p:cNvSpPr/>
-          <p:nvPr/>
-        </p:nvSpPr>
-        <p:spPr>
-          <a:xfrm>
-            <a:off x="1055823" y="2624920"/>
-            <a:ext cx="9575800" cy="3485402"/>
-          </a:xfrm>
-          <a:prstGeom prst="rect">
-            <a:avLst/>
-          </a:prstGeom>
-          <a:solidFill>
-            <a:schemeClr val="bg1">
-              <a:lumMod val="75000"/>
-            </a:schemeClr>
-          </a:solidFill>
-          <a:ln>
-            <a:noFill/>
-          </a:ln>
-          <a:effectLst/>
-        </p:spPr>
-        <p:style>
-          <a:lnRef idx="1">
-            <a:schemeClr val="accent1"/>
-          </a:lnRef>
-          <a:fillRef idx="3">
-            <a:schemeClr val="accent1"/>
-          </a:fillRef>
-          <a:effectRef idx="2">
-            <a:schemeClr val="accent1"/>
-          </a:effectRef>
-          <a:fontRef idx="minor">
-            <a:schemeClr val="lt1"/>
-          </a:fontRef>
-        </p:style>
-        <p:txBody>
-          <a:bodyPr rtlCol="0" anchor="ctr"/>
-          <a:lstStyle/>
-          <a:p>
-            <a:pPr algn="ctr"/>
-            <a:endParaRPr lang="en-US" dirty="0" err="1" smtClean="0"/>
-          </a:p>
-        </p:txBody>
-      </p:sp>
-      <p:sp>
-        <p:nvSpPr>
-          <p:cNvPr id="2" name="Titel 1"/>
-          <p:cNvSpPr>
-            <a:spLocks noGrp="1"/>
-          </p:cNvSpPr>
-          <p:nvPr>
-            <p:ph type="title"/>
-          </p:nvPr>
-        </p:nvSpPr>
-        <p:spPr/>
-        <p:txBody>
-          <a:bodyPr/>
-          <a:lstStyle/>
-          <a:p>
-            <a:r>
-              <a:rPr lang="de-DE" dirty="0" smtClean="0"/>
-              <a:t>The Cloud Native Stack</a:t>
-            </a:r>
-            <a:endParaRPr lang="de-DE" dirty="0"/>
-          </a:p>
-        </p:txBody>
-      </p:sp>
-      <p:sp>
-        <p:nvSpPr>
-          <p:cNvPr id="3" name="Foliennummernplatzhalter 2"/>
-          <p:cNvSpPr>
-            <a:spLocks noGrp="1"/>
-          </p:cNvSpPr>
-          <p:nvPr>
-            <p:ph type="sldNum" sz="quarter" idx="11"/>
-          </p:nvPr>
-        </p:nvSpPr>
-        <p:spPr/>
-        <p:txBody>
-          <a:bodyPr/>
-          <a:lstStyle/>
-          <a:p>
-            <a:fld id="{EBCCEB8C-0C59-3646-8774-4E9611D20F23}" type="slidenum">
-              <a:rPr lang="de-DE" smtClean="0"/>
-              <a:pPr/>
-              <a:t>2</a:t>
-            </a:fld>
-            <a:endParaRPr lang="de-DE" dirty="0"/>
-          </a:p>
-        </p:txBody>
-      </p:sp>
-      <p:sp>
-        <p:nvSpPr>
-          <p:cNvPr id="5" name="Rechteck 4"/>
-          <p:cNvSpPr/>
-          <p:nvPr/>
-        </p:nvSpPr>
-        <p:spPr>
-          <a:xfrm>
-            <a:off x="1271430" y="4086558"/>
-            <a:ext cx="9144587" cy="768350"/>
-          </a:xfrm>
-          <a:prstGeom prst="rect">
-            <a:avLst/>
-          </a:prstGeom>
-          <a:solidFill>
-            <a:schemeClr val="accent4"/>
-          </a:solidFill>
-          <a:ln>
-            <a:noFill/>
-          </a:ln>
-          <a:effectLst/>
-        </p:spPr>
-        <p:style>
-          <a:lnRef idx="1">
-            <a:schemeClr val="accent1"/>
-          </a:lnRef>
-          <a:fillRef idx="3">
-            <a:schemeClr val="accent1"/>
-          </a:fillRef>
-          <a:effectRef idx="2">
-            <a:schemeClr val="accent1"/>
-          </a:effectRef>
-          <a:fontRef idx="minor">
-            <a:schemeClr val="lt1"/>
-          </a:fontRef>
-        </p:style>
-        <p:txBody>
-          <a:bodyPr rtlCol="0" anchor="ctr"/>
-          <a:lstStyle/>
-          <a:p>
-            <a:pPr algn="ctr"/>
-            <a:endParaRPr lang="de-DE" dirty="0" err="1" smtClean="0"/>
-          </a:p>
-        </p:txBody>
-      </p:sp>
-      <p:sp>
-        <p:nvSpPr>
-          <p:cNvPr id="6" name="Rechteck 5"/>
-          <p:cNvSpPr/>
-          <p:nvPr/>
-        </p:nvSpPr>
-        <p:spPr>
-          <a:xfrm>
-            <a:off x="1271430" y="3080916"/>
-            <a:ext cx="9144587" cy="768350"/>
-          </a:xfrm>
-          <a:prstGeom prst="rect">
-            <a:avLst/>
-          </a:prstGeom>
-          <a:solidFill>
-            <a:srgbClr val="386B9B"/>
-          </a:solidFill>
-          <a:ln>
-            <a:noFill/>
-          </a:ln>
-          <a:effectLst/>
-        </p:spPr>
-        <p:style>
-          <a:lnRef idx="1">
-            <a:schemeClr val="accent1"/>
-          </a:lnRef>
-          <a:fillRef idx="3">
-            <a:schemeClr val="accent1"/>
-          </a:fillRef>
-          <a:effectRef idx="2">
-            <a:schemeClr val="accent1"/>
-          </a:effectRef>
-          <a:fontRef idx="minor">
-            <a:schemeClr val="lt1"/>
-          </a:fontRef>
-        </p:style>
-        <p:txBody>
-          <a:bodyPr rtlCol="0" anchor="ctr"/>
-          <a:lstStyle/>
-          <a:p>
-            <a:pPr algn="ctr"/>
-            <a:endParaRPr lang="de-DE" dirty="0" err="1" smtClean="0"/>
-          </a:p>
-        </p:txBody>
-      </p:sp>
-      <p:sp>
-        <p:nvSpPr>
-          <p:cNvPr id="8" name="Rechteck 7"/>
-          <p:cNvSpPr/>
-          <p:nvPr/>
-        </p:nvSpPr>
-        <p:spPr>
-          <a:xfrm>
-            <a:off x="1271430" y="1683993"/>
-            <a:ext cx="6428219" cy="768350"/>
-          </a:xfrm>
-          <a:prstGeom prst="rect">
-            <a:avLst/>
-          </a:prstGeom>
-          <a:solidFill>
-            <a:schemeClr val="accent4"/>
-          </a:solidFill>
-          <a:ln>
-            <a:noFill/>
-          </a:ln>
-          <a:effectLst/>
-        </p:spPr>
-        <p:style>
-          <a:lnRef idx="1">
-            <a:schemeClr val="accent1"/>
-          </a:lnRef>
-          <a:fillRef idx="3">
-            <a:schemeClr val="accent1"/>
-          </a:fillRef>
-          <a:effectRef idx="2">
-            <a:schemeClr val="accent1"/>
-          </a:effectRef>
-          <a:fontRef idx="minor">
-            <a:schemeClr val="lt1"/>
-          </a:fontRef>
-        </p:style>
-        <p:txBody>
-          <a:bodyPr rtlCol="0" anchor="ctr"/>
-          <a:lstStyle/>
-          <a:p>
-            <a:pPr algn="ctr"/>
-            <a:endParaRPr lang="de-DE" dirty="0" err="1" smtClean="0"/>
-          </a:p>
-        </p:txBody>
-      </p:sp>
-      <p:sp>
-        <p:nvSpPr>
-          <p:cNvPr id="9" name="Rechteck 8"/>
-          <p:cNvSpPr/>
-          <p:nvPr/>
-        </p:nvSpPr>
-        <p:spPr>
-          <a:xfrm>
-            <a:off x="1280698" y="5128651"/>
-            <a:ext cx="9135320" cy="768350"/>
-          </a:xfrm>
-          <a:prstGeom prst="rect">
-            <a:avLst/>
-          </a:prstGeom>
-          <a:solidFill>
-            <a:srgbClr val="386B9B"/>
-          </a:solidFill>
-          <a:ln>
-            <a:noFill/>
-          </a:ln>
-          <a:effectLst/>
-        </p:spPr>
-        <p:style>
-          <a:lnRef idx="1">
-            <a:schemeClr val="accent1"/>
-          </a:lnRef>
-          <a:fillRef idx="3">
-            <a:schemeClr val="accent1"/>
-          </a:fillRef>
-          <a:effectRef idx="2">
-            <a:schemeClr val="accent1"/>
-          </a:effectRef>
-          <a:fontRef idx="minor">
-            <a:schemeClr val="lt1"/>
-          </a:fontRef>
-        </p:style>
-        <p:txBody>
-          <a:bodyPr rtlCol="0" anchor="ctr"/>
-          <a:lstStyle/>
-          <a:p>
-            <a:pPr algn="ctr"/>
-            <a:endParaRPr lang="de-DE" dirty="0" err="1" smtClean="0"/>
-          </a:p>
-        </p:txBody>
-      </p:sp>
-      <p:sp>
-        <p:nvSpPr>
-          <p:cNvPr id="13" name="Textfeld 12"/>
-          <p:cNvSpPr txBox="1"/>
-          <p:nvPr/>
-        </p:nvSpPr>
-        <p:spPr>
-          <a:xfrm>
-            <a:off x="4081018" y="5256794"/>
-            <a:ext cx="3005246" cy="461665"/>
-          </a:xfrm>
-          <a:prstGeom prst="rect">
-            <a:avLst/>
-          </a:prstGeom>
-          <a:noFill/>
-        </p:spPr>
-        <p:txBody>
-          <a:bodyPr wrap="none" rtlCol="0">
-            <a:spAutoFit/>
-          </a:bodyPr>
-          <a:lstStyle/>
-          <a:p>
-            <a:r>
-              <a:rPr lang="de-DE" sz="2400" smtClean="0">
-                <a:solidFill>
-                  <a:schemeClr val="bg1"/>
-                </a:solidFill>
-                <a:latin typeface="+mj-lt"/>
-                <a:ea typeface="Cambria Math" panose="02040503050406030204" pitchFamily="18" charset="0"/>
-              </a:rPr>
-              <a:t>Cluster </a:t>
-            </a:r>
-            <a:r>
-              <a:rPr lang="de-DE" sz="2400" dirty="0" err="1" smtClean="0">
-                <a:solidFill>
-                  <a:schemeClr val="bg1"/>
-                </a:solidFill>
-                <a:latin typeface="+mj-lt"/>
-                <a:ea typeface="Cambria Math" panose="02040503050406030204" pitchFamily="18" charset="0"/>
-              </a:rPr>
-              <a:t>Virtualization</a:t>
-            </a:r>
-            <a:endParaRPr lang="de-DE" sz="2400" dirty="0">
-              <a:solidFill>
-                <a:schemeClr val="bg1"/>
-              </a:solidFill>
-              <a:latin typeface="+mj-lt"/>
-              <a:ea typeface="Cambria Math" panose="02040503050406030204" pitchFamily="18" charset="0"/>
-            </a:endParaRPr>
-          </a:p>
-        </p:txBody>
-      </p:sp>
-      <p:sp>
-        <p:nvSpPr>
-          <p:cNvPr id="14" name="Textfeld 13"/>
-          <p:cNvSpPr txBox="1"/>
-          <p:nvPr/>
-        </p:nvSpPr>
-        <p:spPr>
-          <a:xfrm>
-            <a:off x="4040820" y="4229806"/>
-            <a:ext cx="2634054" cy="461665"/>
-          </a:xfrm>
-          <a:prstGeom prst="rect">
-            <a:avLst/>
-          </a:prstGeom>
-          <a:noFill/>
-        </p:spPr>
-        <p:txBody>
-          <a:bodyPr wrap="none" rtlCol="0">
-            <a:spAutoFit/>
-          </a:bodyPr>
-          <a:lstStyle/>
-          <a:p>
-            <a:r>
-              <a:rPr lang="de-DE" sz="2400" dirty="0" smtClean="0">
-                <a:solidFill>
-                  <a:schemeClr val="bg1"/>
-                </a:solidFill>
-                <a:latin typeface="+mj-lt"/>
-                <a:ea typeface="Cambria Math" panose="02040503050406030204" pitchFamily="18" charset="0"/>
-              </a:rPr>
-              <a:t>Cluster Scheduler</a:t>
-            </a:r>
-            <a:endParaRPr lang="de-DE" sz="2400" dirty="0">
-              <a:solidFill>
-                <a:schemeClr val="bg1"/>
-              </a:solidFill>
-              <a:latin typeface="+mj-lt"/>
-              <a:ea typeface="Cambria Math" panose="02040503050406030204" pitchFamily="18" charset="0"/>
-            </a:endParaRPr>
-          </a:p>
-        </p:txBody>
-      </p:sp>
-      <p:sp>
-        <p:nvSpPr>
-          <p:cNvPr id="15" name="Textfeld 14"/>
-          <p:cNvSpPr txBox="1"/>
-          <p:nvPr/>
-        </p:nvSpPr>
-        <p:spPr>
-          <a:xfrm>
-            <a:off x="4040820" y="3219665"/>
-            <a:ext cx="2956259" cy="461665"/>
-          </a:xfrm>
-          <a:prstGeom prst="rect">
-            <a:avLst/>
-          </a:prstGeom>
-          <a:noFill/>
-        </p:spPr>
-        <p:txBody>
-          <a:bodyPr wrap="none" rtlCol="0">
-            <a:spAutoFit/>
-          </a:bodyPr>
-          <a:lstStyle/>
-          <a:p>
-            <a:r>
-              <a:rPr lang="de-DE" sz="2400" dirty="0" smtClean="0">
-                <a:solidFill>
-                  <a:schemeClr val="bg1"/>
-                </a:solidFill>
-                <a:latin typeface="+mj-lt"/>
-                <a:ea typeface="Cambria Math" panose="02040503050406030204" pitchFamily="18" charset="0"/>
-              </a:rPr>
-              <a:t>Cluster </a:t>
-            </a:r>
-            <a:r>
-              <a:rPr lang="de-DE" sz="2400" dirty="0" err="1" smtClean="0">
-                <a:solidFill>
-                  <a:schemeClr val="bg1"/>
-                </a:solidFill>
-                <a:latin typeface="+mj-lt"/>
-                <a:ea typeface="Cambria Math" panose="02040503050406030204" pitchFamily="18" charset="0"/>
-              </a:rPr>
-              <a:t>Orchestrator</a:t>
-            </a:r>
-            <a:endParaRPr lang="de-DE" sz="2400" dirty="0">
-              <a:solidFill>
-                <a:schemeClr val="bg1"/>
-              </a:solidFill>
-              <a:latin typeface="+mj-lt"/>
-              <a:ea typeface="Cambria Math" panose="02040503050406030204" pitchFamily="18" charset="0"/>
-            </a:endParaRPr>
-          </a:p>
-        </p:txBody>
-      </p:sp>
-      <p:sp>
-        <p:nvSpPr>
-          <p:cNvPr id="16" name="Textfeld 15"/>
-          <p:cNvSpPr txBox="1"/>
-          <p:nvPr/>
-        </p:nvSpPr>
-        <p:spPr>
-          <a:xfrm>
-            <a:off x="1431224" y="1611230"/>
-            <a:ext cx="3924088" cy="830997"/>
-          </a:xfrm>
-          <a:prstGeom prst="rect">
-            <a:avLst/>
-          </a:prstGeom>
-          <a:noFill/>
-        </p:spPr>
-        <p:txBody>
-          <a:bodyPr wrap="square" rtlCol="0">
-            <a:spAutoFit/>
-          </a:bodyPr>
-          <a:lstStyle/>
-          <a:p>
-            <a:r>
-              <a:rPr lang="de-DE" sz="2400" dirty="0" smtClean="0">
-                <a:solidFill>
-                  <a:schemeClr val="bg1"/>
-                </a:solidFill>
-                <a:latin typeface="+mj-lt"/>
-                <a:ea typeface="Cambria Math" panose="02040503050406030204" pitchFamily="18" charset="0"/>
-              </a:rPr>
-              <a:t>Cloud Native </a:t>
-            </a:r>
-            <a:br>
-              <a:rPr lang="de-DE" sz="2400" dirty="0" smtClean="0">
-                <a:solidFill>
-                  <a:schemeClr val="bg1"/>
-                </a:solidFill>
-                <a:latin typeface="+mj-lt"/>
-                <a:ea typeface="Cambria Math" panose="02040503050406030204" pitchFamily="18" charset="0"/>
-              </a:rPr>
-            </a:br>
-            <a:r>
-              <a:rPr lang="de-DE" sz="2400" dirty="0" err="1" smtClean="0">
-                <a:solidFill>
-                  <a:schemeClr val="bg1"/>
-                </a:solidFill>
-                <a:latin typeface="+mj-lt"/>
-                <a:ea typeface="Cambria Math" panose="02040503050406030204" pitchFamily="18" charset="0"/>
-              </a:rPr>
-              <a:t>Application</a:t>
-            </a:r>
-            <a:r>
-              <a:rPr lang="de-DE" sz="2400" dirty="0" smtClean="0">
-                <a:solidFill>
-                  <a:schemeClr val="bg1"/>
-                </a:solidFill>
-                <a:latin typeface="+mj-lt"/>
-                <a:ea typeface="Cambria Math" panose="02040503050406030204" pitchFamily="18" charset="0"/>
-              </a:rPr>
-              <a:t> </a:t>
-            </a:r>
-            <a:r>
-              <a:rPr lang="de-DE" sz="2400" dirty="0" err="1" smtClean="0">
-                <a:solidFill>
-                  <a:schemeClr val="bg1"/>
-                </a:solidFill>
-                <a:latin typeface="+mj-lt"/>
-                <a:ea typeface="Cambria Math" panose="02040503050406030204" pitchFamily="18" charset="0"/>
-              </a:rPr>
-              <a:t>Platform</a:t>
-            </a:r>
-            <a:endParaRPr lang="de-DE" sz="2400" dirty="0">
-              <a:solidFill>
-                <a:schemeClr val="bg1"/>
-              </a:solidFill>
-              <a:latin typeface="+mj-lt"/>
-              <a:ea typeface="Cambria Math" panose="02040503050406030204" pitchFamily="18" charset="0"/>
-            </a:endParaRPr>
-          </a:p>
-        </p:txBody>
-      </p:sp>
-      <p:sp>
-        <p:nvSpPr>
-          <p:cNvPr id="17" name="Abgerundetes Rechteck 16"/>
-          <p:cNvSpPr/>
-          <p:nvPr/>
-        </p:nvSpPr>
-        <p:spPr>
-          <a:xfrm>
-            <a:off x="4927600" y="1782823"/>
-            <a:ext cx="2674895" cy="543323"/>
-          </a:xfrm>
-          <a:prstGeom prst="roundRect">
-            <a:avLst/>
-          </a:prstGeom>
-          <a:solidFill>
-            <a:schemeClr val="bg1">
-              <a:lumMod val="95000"/>
-            </a:schemeClr>
-          </a:solidFill>
-          <a:ln>
-            <a:noFill/>
-          </a:ln>
-          <a:effectLst/>
-        </p:spPr>
-        <p:style>
-          <a:lnRef idx="1">
-            <a:schemeClr val="accent1"/>
-          </a:lnRef>
-          <a:fillRef idx="3">
-            <a:schemeClr val="accent1"/>
-          </a:fillRef>
-          <a:effectRef idx="2">
-            <a:schemeClr val="accent1"/>
-          </a:effectRef>
-          <a:fontRef idx="minor">
-            <a:schemeClr val="lt1"/>
-          </a:fontRef>
-        </p:style>
-        <p:txBody>
-          <a:bodyPr rtlCol="0" anchor="ctr"/>
-          <a:lstStyle/>
-          <a:p>
-            <a:pPr algn="ctr"/>
-            <a:r>
-              <a:rPr lang="de-DE" sz="2400" dirty="0" smtClean="0">
-                <a:solidFill>
-                  <a:schemeClr val="tx1"/>
-                </a:solidFill>
-              </a:rPr>
-              <a:t>Cloud Native App</a:t>
-            </a:r>
-            <a:endParaRPr lang="de-DE" sz="2400" dirty="0" smtClean="0">
-              <a:solidFill>
-                <a:schemeClr val="tx1"/>
-              </a:solidFill>
-            </a:endParaRPr>
-          </a:p>
-        </p:txBody>
-      </p:sp>
-      <p:sp>
-        <p:nvSpPr>
-          <p:cNvPr id="18" name="Abgerundetes Rechteck 17"/>
-          <p:cNvSpPr/>
-          <p:nvPr/>
-        </p:nvSpPr>
-        <p:spPr>
-          <a:xfrm>
-            <a:off x="8199203" y="3168865"/>
-            <a:ext cx="2083544" cy="501805"/>
-          </a:xfrm>
-          <a:prstGeom prst="roundRect">
-            <a:avLst/>
-          </a:prstGeom>
-          <a:solidFill>
-            <a:schemeClr val="bg1">
-              <a:lumMod val="95000"/>
-            </a:schemeClr>
-          </a:solidFill>
-          <a:ln>
-            <a:noFill/>
-          </a:ln>
-          <a:effectLst/>
-        </p:spPr>
-        <p:style>
-          <a:lnRef idx="1">
-            <a:schemeClr val="accent1"/>
-          </a:lnRef>
-          <a:fillRef idx="3">
-            <a:schemeClr val="accent1"/>
-          </a:fillRef>
-          <a:effectRef idx="2">
-            <a:schemeClr val="accent1"/>
-          </a:effectRef>
-          <a:fontRef idx="minor">
-            <a:schemeClr val="lt1"/>
-          </a:fontRef>
-        </p:style>
-        <p:txBody>
-          <a:bodyPr rtlCol="0" anchor="ctr"/>
-          <a:lstStyle/>
-          <a:p>
-            <a:pPr algn="ctr"/>
-            <a:r>
-              <a:rPr lang="de-DE" sz="2400" dirty="0" err="1" smtClean="0">
-                <a:solidFill>
-                  <a:schemeClr val="tx1"/>
-                </a:solidFill>
-              </a:rPr>
-              <a:t>Applications</a:t>
-            </a:r>
-            <a:endParaRPr lang="de-DE" sz="2400" dirty="0" smtClean="0">
-              <a:solidFill>
-                <a:schemeClr val="tx1"/>
-              </a:solidFill>
-            </a:endParaRPr>
-          </a:p>
-        </p:txBody>
-      </p:sp>
-      <p:sp>
-        <p:nvSpPr>
-          <p:cNvPr id="19" name="Abgerundetes Rechteck 18"/>
-          <p:cNvSpPr/>
-          <p:nvPr/>
-        </p:nvSpPr>
-        <p:spPr>
-          <a:xfrm>
-            <a:off x="8199203" y="4212027"/>
-            <a:ext cx="2083544" cy="501805"/>
-          </a:xfrm>
-          <a:prstGeom prst="roundRect">
-            <a:avLst/>
-          </a:prstGeom>
-          <a:solidFill>
-            <a:schemeClr val="bg1">
-              <a:lumMod val="95000"/>
-            </a:schemeClr>
-          </a:solidFill>
-          <a:ln>
-            <a:noFill/>
-          </a:ln>
-          <a:effectLst/>
-        </p:spPr>
-        <p:style>
-          <a:lnRef idx="1">
-            <a:schemeClr val="accent1"/>
-          </a:lnRef>
-          <a:fillRef idx="3">
-            <a:schemeClr val="accent1"/>
-          </a:fillRef>
-          <a:effectRef idx="2">
-            <a:schemeClr val="accent1"/>
-          </a:effectRef>
-          <a:fontRef idx="minor">
-            <a:schemeClr val="lt1"/>
-          </a:fontRef>
-        </p:style>
-        <p:txBody>
-          <a:bodyPr rtlCol="0" anchor="ctr"/>
-          <a:lstStyle/>
-          <a:p>
-            <a:pPr algn="ctr"/>
-            <a:r>
-              <a:rPr lang="de-DE" sz="2400" dirty="0" smtClean="0">
-                <a:solidFill>
-                  <a:schemeClr val="tx1"/>
-                </a:solidFill>
-              </a:rPr>
-              <a:t>Container</a:t>
-            </a:r>
-          </a:p>
-        </p:txBody>
-      </p:sp>
-      <p:sp>
-        <p:nvSpPr>
-          <p:cNvPr id="20" name="Abgerundetes Rechteck 19"/>
-          <p:cNvSpPr/>
-          <p:nvPr/>
-        </p:nvSpPr>
-        <p:spPr>
-          <a:xfrm>
-            <a:off x="8199203" y="5256794"/>
-            <a:ext cx="2083544" cy="501805"/>
-          </a:xfrm>
-          <a:prstGeom prst="roundRect">
-            <a:avLst/>
-          </a:prstGeom>
-          <a:solidFill>
-            <a:schemeClr val="bg1">
-              <a:lumMod val="95000"/>
-            </a:schemeClr>
-          </a:solidFill>
-          <a:ln>
-            <a:noFill/>
-          </a:ln>
-          <a:effectLst/>
-        </p:spPr>
-        <p:style>
-          <a:lnRef idx="1">
-            <a:schemeClr val="accent1"/>
-          </a:lnRef>
-          <a:fillRef idx="3">
-            <a:schemeClr val="accent1"/>
-          </a:fillRef>
-          <a:effectRef idx="2">
-            <a:schemeClr val="accent1"/>
-          </a:effectRef>
-          <a:fontRef idx="minor">
-            <a:schemeClr val="lt1"/>
-          </a:fontRef>
-        </p:style>
-        <p:txBody>
-          <a:bodyPr rtlCol="0" anchor="ctr"/>
-          <a:lstStyle/>
-          <a:p>
-            <a:pPr algn="ctr"/>
-            <a:r>
-              <a:rPr lang="de-DE" sz="2400" dirty="0" smtClean="0">
-                <a:solidFill>
-                  <a:schemeClr val="tx1"/>
-                </a:solidFill>
-              </a:rPr>
-              <a:t>Resources</a:t>
-            </a:r>
-          </a:p>
-        </p:txBody>
-      </p:sp>
-      <p:sp>
-        <p:nvSpPr>
-          <p:cNvPr id="24" name="Rechteck 23"/>
-          <p:cNvSpPr/>
-          <p:nvPr/>
-        </p:nvSpPr>
-        <p:spPr>
-          <a:xfrm>
-            <a:off x="7854715" y="1683017"/>
-            <a:ext cx="2561301" cy="768350"/>
-          </a:xfrm>
-          <a:prstGeom prst="rect">
-            <a:avLst/>
-          </a:prstGeom>
-          <a:solidFill>
-            <a:schemeClr val="tx1">
-              <a:lumMod val="65000"/>
-              <a:lumOff val="35000"/>
-            </a:schemeClr>
-          </a:solidFill>
-          <a:ln>
-            <a:noFill/>
-          </a:ln>
-          <a:effectLst/>
-        </p:spPr>
-        <p:style>
-          <a:lnRef idx="1">
-            <a:schemeClr val="accent1"/>
-          </a:lnRef>
-          <a:fillRef idx="3">
-            <a:schemeClr val="accent1"/>
-          </a:fillRef>
-          <a:effectRef idx="2">
-            <a:schemeClr val="accent1"/>
-          </a:effectRef>
-          <a:fontRef idx="minor">
-            <a:schemeClr val="lt1"/>
-          </a:fontRef>
-        </p:style>
-        <p:txBody>
-          <a:bodyPr rtlCol="0" anchor="ctr"/>
-          <a:lstStyle/>
-          <a:p>
-            <a:pPr algn="ctr"/>
-            <a:r>
-              <a:rPr lang="de-DE" sz="2400" dirty="0" err="1" smtClean="0"/>
-              <a:t>Classical</a:t>
-            </a:r>
-            <a:r>
-              <a:rPr lang="de-DE" sz="2400" dirty="0" smtClean="0"/>
-              <a:t> </a:t>
-            </a:r>
-            <a:r>
-              <a:rPr lang="de-DE" sz="2400" dirty="0" err="1" smtClean="0"/>
-              <a:t>Applications</a:t>
-            </a:r>
-            <a:endParaRPr lang="de-DE" sz="2400" dirty="0" smtClean="0"/>
-          </a:p>
-        </p:txBody>
-      </p:sp>
-      <p:sp>
-        <p:nvSpPr>
-          <p:cNvPr id="27" name="Textfeld 14"/>
-          <p:cNvSpPr txBox="1"/>
-          <p:nvPr/>
-        </p:nvSpPr>
-        <p:spPr>
-          <a:xfrm>
-            <a:off x="3761420" y="2584236"/>
-            <a:ext cx="3709670" cy="461665"/>
-          </a:xfrm>
-          <a:prstGeom prst="rect">
-            <a:avLst/>
-          </a:prstGeom>
-          <a:noFill/>
-        </p:spPr>
-        <p:txBody>
-          <a:bodyPr wrap="none" rtlCol="0">
-            <a:spAutoFit/>
-          </a:bodyPr>
-          <a:lstStyle/>
-          <a:p>
-            <a:r>
-              <a:rPr lang="de-DE" sz="2400" dirty="0" smtClean="0">
-                <a:latin typeface="+mj-lt"/>
-                <a:ea typeface="Cambria Math" panose="02040503050406030204" pitchFamily="18" charset="0"/>
-              </a:rPr>
-              <a:t>Cluster </a:t>
-            </a:r>
-            <a:r>
-              <a:rPr lang="de-DE" sz="2400" dirty="0" smtClean="0">
-                <a:latin typeface="+mj-lt"/>
-                <a:ea typeface="Cambria Math" panose="02040503050406030204" pitchFamily="18" charset="0"/>
-              </a:rPr>
-              <a:t>Operating System</a:t>
-            </a:r>
-            <a:endParaRPr lang="de-DE" sz="2400" dirty="0">
-              <a:latin typeface="+mj-lt"/>
-              <a:ea typeface="Cambria Math" panose="02040503050406030204" pitchFamily="18" charset="0"/>
-            </a:endParaRPr>
-          </a:p>
-        </p:txBody>
-      </p:sp>
-    </p:spTree>
-    <p:extLst>
-      <p:ext uri="{BB962C8B-B14F-4D97-AF65-F5344CB8AC3E}">
-        <p14:creationId xmlns:p14="http://schemas.microsoft.com/office/powerpoint/2010/main" val="642132713"/>
-      </p:ext>
-    </p:extLst>
-  </p:cSld>
-  <p:clrMapOvr>
-    <a:masterClrMapping/>
-  </p:clrMapOvr>
-  <mc:AlternateContent xmlns:mc="http://schemas.openxmlformats.org/markup-compatibility/2006" xmlns:p14="http://schemas.microsoft.com/office/powerpoint/2010/main">
-    <mc:Choice Requires="p14">
-      <p:transition spd="slow" p14:dur="2000"/>
-    </mc:Choice>
-    <mc:Fallback xmlns="">
-      <p:transition spd="slow"/>
-    </mc:Fallback>
-  </mc:AlternateContent>
-  <p:timing>
-    <p:tnLst>
-      <p:par>
-        <p:cTn id="1" dur="indefinite" restart="never" nodeType="tmRoot"/>
-      </p:par>
-    </p:tnLst>
-  </p:timing>
-</p:sld>
-</file>
-
-<file path=ppt/slides/slide3.xml><?xml version="1.0" encoding="utf-8"?>
 <p:sld xmlns:a="http://schemas.openxmlformats.org/drawingml/2006/main" xmlns:r="http://schemas.openxmlformats.org/officeDocument/2006/relationships" xmlns:p="http://schemas.openxmlformats.org/presentationml/2006/main">
   <p:cSld>
     <p:spTree>
@@ -22666,6 +21791,92 @@
 </p:sld>
 </file>
 
+<file path=ppt/slides/slide3.xml><?xml version="1.0" encoding="utf-8"?>
+<p:sld xmlns:a="http://schemas.openxmlformats.org/drawingml/2006/main" xmlns:r="http://schemas.openxmlformats.org/officeDocument/2006/relationships" xmlns:p="http://schemas.openxmlformats.org/presentationml/2006/main">
+  <p:cSld>
+    <p:spTree>
+      <p:nvGrpSpPr>
+        <p:cNvPr id="1" name=""/>
+        <p:cNvGrpSpPr/>
+        <p:nvPr/>
+      </p:nvGrpSpPr>
+      <p:grpSpPr>
+        <a:xfrm>
+          <a:off x="0" y="0"/>
+          <a:ext cx="0" cy="0"/>
+          <a:chOff x="0" y="0"/>
+          <a:chExt cx="0" cy="0"/>
+        </a:xfrm>
+      </p:grpSpPr>
+      <p:sp>
+        <p:nvSpPr>
+          <p:cNvPr id="2" name="Foliennummernplatzhalter 1"/>
+          <p:cNvSpPr>
+            <a:spLocks noGrp="1"/>
+          </p:cNvSpPr>
+          <p:nvPr>
+            <p:ph type="sldNum" sz="quarter" idx="11"/>
+          </p:nvPr>
+        </p:nvSpPr>
+        <p:spPr/>
+        <p:txBody>
+          <a:bodyPr/>
+          <a:lstStyle/>
+          <a:p>
+            <a:fld id="{EBCCEB8C-0C59-3646-8774-4E9611D20F23}" type="slidenum">
+              <a:rPr lang="de-DE" smtClean="0"/>
+              <a:pPr/>
+              <a:t>3</a:t>
+            </a:fld>
+            <a:endParaRPr lang="de-DE" dirty="0"/>
+          </a:p>
+        </p:txBody>
+      </p:sp>
+      <p:pic>
+        <p:nvPicPr>
+          <p:cNvPr id="4" name="Grafik 3"/>
+          <p:cNvPicPr>
+            <a:picLocks noChangeAspect="1"/>
+          </p:cNvPicPr>
+          <p:nvPr/>
+        </p:nvPicPr>
+        <p:blipFill>
+          <a:blip r:embed="rId2"/>
+          <a:stretch>
+            <a:fillRect/>
+          </a:stretch>
+        </p:blipFill>
+        <p:spPr>
+          <a:xfrm>
+            <a:off x="868105" y="-2086"/>
+            <a:ext cx="10638095" cy="6754152"/>
+          </a:xfrm>
+          <a:prstGeom prst="rect">
+            <a:avLst/>
+          </a:prstGeom>
+        </p:spPr>
+      </p:pic>
+    </p:spTree>
+    <p:extLst>
+      <p:ext uri="{BB962C8B-B14F-4D97-AF65-F5344CB8AC3E}">
+        <p14:creationId xmlns:p14="http://schemas.microsoft.com/office/powerpoint/2010/main" val="1018477474"/>
+      </p:ext>
+    </p:extLst>
+  </p:cSld>
+  <p:clrMapOvr>
+    <a:masterClrMapping/>
+  </p:clrMapOvr>
+  <mc:AlternateContent xmlns:mc="http://schemas.openxmlformats.org/markup-compatibility/2006" xmlns:p14="http://schemas.microsoft.com/office/powerpoint/2010/main">
+    <mc:Choice Requires="p14">
+      <p:transition spd="slow" p14:dur="2000"/>
+    </mc:Choice>
+    <mc:Fallback xmlns="">
+      <p:transition spd="slow"/>
+    </mc:Fallback>
+  </mc:AlternateContent>
+</p:sld>
+</file>
+
 <file path=ppt/slides/slide4.xml><?xml version="1.0" encoding="utf-8"?>
 <p:sld xmlns:a="http://schemas.openxmlformats.org/drawingml/2006/main" xmlns:r="http://schemas.openxmlformats.org/officeDocument/2006/relationships" xmlns:p="http://schemas.openxmlformats.org/presentationml/2006/main">
   <p:cSld>
@@ -22685,12 +21896,12 @@
       </p:grpSpPr>
       <p:sp>
         <p:nvSpPr>
-          <p:cNvPr id="2" name="Foliennummernplatzhalter 1"/>
-          <p:cNvSpPr>
-            <a:spLocks noGrp="1"/>
-          </p:cNvSpPr>
-          <p:nvPr>
-            <p:ph type="sldNum" sz="quarter" idx="11"/>
+          <p:cNvPr id="2" name="Title 1"/>
+          <p:cNvSpPr>
+            <a:spLocks noGrp="1"/>
+          </p:cNvSpPr>
+          <p:nvPr>
+            <p:ph type="title"/>
           </p:nvPr>
         </p:nvSpPr>
         <p:spPr/>
@@ -22698,43 +21909,86 @@
           <a:bodyPr/>
           <a:lstStyle/>
           <a:p>
-            <a:fld id="{EBCCEB8C-0C59-3646-8774-4E9611D20F23}" type="slidenum">
-              <a:rPr lang="de-DE" smtClean="0"/>
-              <a:pPr/>
+            <a:r>
+              <a:rPr lang="en-US" dirty="0" smtClean="0"/>
+              <a:t>Sneak Preview: Kubernetes</a:t>
+            </a:r>
+            <a:endParaRPr lang="en-US" dirty="0"/>
+          </a:p>
+        </p:txBody>
+      </p:sp>
+      <p:sp>
+        <p:nvSpPr>
+          <p:cNvPr id="3" name="Slide Number Placeholder 2"/>
+          <p:cNvSpPr>
+            <a:spLocks noGrp="1"/>
+          </p:cNvSpPr>
+          <p:nvPr>
+            <p:ph type="sldNum" sz="quarter" idx="11"/>
+          </p:nvPr>
+        </p:nvSpPr>
+        <p:spPr/>
+        <p:txBody>
+          <a:bodyPr/>
+          <a:lstStyle/>
+          <a:p>
+            <a:fld id="{213282FB-536A-4491-BC5C-9B3AAEEA56EF}" type="slidenum">
+              <a:rPr lang="de-DE" smtClean="0"/>
               <a:t>4</a:t>
             </a:fld>
-            <a:endParaRPr lang="de-DE" dirty="0"/>
-          </a:p>
-        </p:txBody>
-      </p:sp>
-      <p:pic>
-        <p:nvPicPr>
-          <p:cNvPr id="4" name="Grafik 3"/>
-          <p:cNvPicPr>
-            <a:picLocks noChangeAspect="1"/>
-          </p:cNvPicPr>
-          <p:nvPr/>
-        </p:nvPicPr>
-        <p:blipFill>
-          <a:blip r:embed="rId2"/>
-          <a:stretch>
-            <a:fillRect/>
-          </a:stretch>
-        </p:blipFill>
-        <p:spPr>
-          <a:xfrm>
-            <a:off x="868105" y="-2086"/>
-            <a:ext cx="10638095" cy="6754152"/>
-          </a:xfrm>
-          <a:prstGeom prst="rect">
-            <a:avLst/>
-          </a:prstGeom>
-        </p:spPr>
-      </p:pic>
+            <a:endParaRPr lang="de-DE"/>
+          </a:p>
+        </p:txBody>
+      </p:sp>
+      <p:sp>
+        <p:nvSpPr>
+          <p:cNvPr id="4" name="Content Placeholder 3"/>
+          <p:cNvSpPr>
+            <a:spLocks noGrp="1"/>
+          </p:cNvSpPr>
+          <p:nvPr>
+            <p:ph sz="quarter" idx="13"/>
+          </p:nvPr>
+        </p:nvSpPr>
+        <p:spPr/>
+        <p:txBody>
+          <a:bodyPr/>
+          <a:lstStyle/>
+          <a:p>
+            <a:r>
+              <a:rPr lang="en-US" dirty="0" smtClean="0"/>
+              <a:t>Metadata</a:t>
+            </a:r>
+          </a:p>
+          <a:p>
+            <a:r>
+              <a:rPr lang="en-US" dirty="0" smtClean="0"/>
+              <a:t>Basic abstractions</a:t>
+            </a:r>
+          </a:p>
+          <a:p>
+            <a:r>
+              <a:rPr lang="en-US" dirty="0" smtClean="0"/>
+              <a:t>How to get a running cluster</a:t>
+            </a:r>
+          </a:p>
+          <a:p>
+            <a:r>
+              <a:rPr lang="en-US" dirty="0"/>
+              <a:t>Where to </a:t>
+            </a:r>
+            <a:r>
+              <a:rPr lang="en-US" dirty="0" smtClean="0"/>
+              <a:t>start</a:t>
+            </a:r>
+            <a:endParaRPr lang="en-US" dirty="0"/>
+          </a:p>
+        </p:txBody>
+      </p:sp>
     </p:spTree>
     <p:extLst>
       <p:ext uri="{BB962C8B-B14F-4D97-AF65-F5344CB8AC3E}">
-        <p14:creationId xmlns:p14="http://schemas.microsoft.com/office/powerpoint/2010/main" val="1018477474"/>
+        <p14:creationId xmlns:p14="http://schemas.microsoft.com/office/powerpoint/2010/main" val="1821452194"/>
       </p:ext>
     </p:extLst>
   </p:cSld>
@@ -22786,7 +22040,15 @@
           <a:p>
             <a:r>
               <a:rPr lang="en-US" dirty="0" smtClean="0"/>
-              <a:t>Sneak Preview: Kubernetes</a:t>
+              <a:t>Sneak Preview: </a:t>
+            </a:r>
+            <a:r>
+              <a:rPr lang="en-US" dirty="0" err="1" smtClean="0"/>
+              <a:t>OpenShift</a:t>
+            </a:r>
+            <a:r>
+              <a:rPr lang="en-US" dirty="0" smtClean="0"/>
+              <a:t> v3</a:t>
             </a:r>
             <a:endParaRPr lang="en-US" dirty="0"/>
           </a:p>
@@ -22815,10 +22077,53 @@
           </a:p>
         </p:txBody>
       </p:sp>
+      <p:sp>
+        <p:nvSpPr>
+          <p:cNvPr id="4" name="Content Placeholder 3"/>
+          <p:cNvSpPr>
+            <a:spLocks noGrp="1"/>
+          </p:cNvSpPr>
+          <p:nvPr>
+            <p:ph sz="quarter" idx="13"/>
+          </p:nvPr>
+        </p:nvSpPr>
+        <p:spPr/>
+        <p:txBody>
+          <a:bodyPr/>
+          <a:lstStyle/>
+          <a:p>
+            <a:r>
+              <a:rPr lang="en-US" dirty="0"/>
+              <a:t>Metadata</a:t>
+            </a:r>
+          </a:p>
+          <a:p>
+            <a:r>
+              <a:rPr lang="en-US" dirty="0"/>
+              <a:t>Basic abstractions</a:t>
+            </a:r>
+          </a:p>
+          <a:p>
+            <a:r>
+              <a:rPr lang="en-US" dirty="0"/>
+              <a:t>How to get a running cluster</a:t>
+            </a:r>
+          </a:p>
+          <a:p>
+            <a:r>
+              <a:rPr lang="en-US" dirty="0"/>
+              <a:t>Where to start</a:t>
+            </a:r>
+          </a:p>
+          <a:p>
+            <a:endParaRPr lang="en-US" dirty="0"/>
+          </a:p>
+        </p:txBody>
+      </p:sp>
     </p:spTree>
     <p:extLst>
       <p:ext uri="{BB962C8B-B14F-4D97-AF65-F5344CB8AC3E}">
-        <p14:creationId xmlns:p14="http://schemas.microsoft.com/office/powerpoint/2010/main" val="1821452194"/>
+        <p14:creationId xmlns:p14="http://schemas.microsoft.com/office/powerpoint/2010/main" val="1954682925"/>
       </p:ext>
     </p:extLst>
   </p:cSld>
@@ -22874,11 +22179,7 @@
             </a:r>
             <a:r>
               <a:rPr lang="en-US" dirty="0" err="1" smtClean="0"/>
-              <a:t>OpenShift</a:t>
-            </a:r>
-            <a:r>
-              <a:rPr lang="en-US" dirty="0" smtClean="0"/>
-              <a:t> v3</a:t>
+              <a:t>Kontena</a:t>
             </a:r>
             <a:endParaRPr lang="en-US" dirty="0"/>
           </a:p>
@@ -22907,10 +22208,55 @@
           </a:p>
         </p:txBody>
       </p:sp>
+      <p:sp>
+        <p:nvSpPr>
+          <p:cNvPr id="4" name="Content Placeholder 3"/>
+          <p:cNvSpPr>
+            <a:spLocks noGrp="1"/>
+          </p:cNvSpPr>
+          <p:nvPr>
+            <p:ph sz="quarter" idx="13"/>
+          </p:nvPr>
+        </p:nvSpPr>
+        <p:spPr/>
+        <p:txBody>
+          <a:bodyPr/>
+          <a:lstStyle/>
+          <a:p>
+            <a:r>
+              <a:rPr lang="en-US" dirty="0"/>
+              <a:t>Metadata</a:t>
+            </a:r>
+          </a:p>
+          <a:p>
+            <a:r>
+              <a:rPr lang="en-US" dirty="0"/>
+              <a:t>Basic abstractions</a:t>
+            </a:r>
+          </a:p>
+          <a:p>
+            <a:r>
+              <a:rPr lang="en-US" dirty="0"/>
+              <a:t>How to get a running cluster</a:t>
+            </a:r>
+          </a:p>
+          <a:p>
+            <a:r>
+              <a:rPr lang="en-US" dirty="0"/>
+              <a:t>Where to </a:t>
+            </a:r>
+            <a:r>
+              <a:rPr lang="en-US" dirty="0" smtClean="0"/>
+              <a:t>start</a:t>
+            </a:r>
+            <a:endParaRPr lang="en-US" dirty="0"/>
+          </a:p>
+        </p:txBody>
+      </p:sp>
     </p:spTree>
     <p:extLst>
       <p:ext uri="{BB962C8B-B14F-4D97-AF65-F5344CB8AC3E}">
-        <p14:creationId xmlns:p14="http://schemas.microsoft.com/office/powerpoint/2010/main" val="1954682925"/>
+        <p14:creationId xmlns:p14="http://schemas.microsoft.com/office/powerpoint/2010/main" val="151088669"/>
       </p:ext>
     </p:extLst>
   </p:cSld>
@@ -22962,11 +22308,11 @@
           <a:p>
             <a:r>
               <a:rPr lang="en-US" dirty="0" smtClean="0"/>
-              <a:t>Sneak Preview: </a:t>
-            </a:r>
-            <a:r>
-              <a:rPr lang="en-US" dirty="0" err="1" smtClean="0"/>
-              <a:t>Kontena</a:t>
+              <a:t>Sneak Preview</a:t>
+            </a:r>
+            <a:r>
+              <a:rPr lang="en-US" smtClean="0"/>
+              <a:t>: Gestalt</a:t>
             </a:r>
             <a:endParaRPr lang="en-US" dirty="0"/>
           </a:p>
@@ -22995,10 +22341,55 @@
           </a:p>
         </p:txBody>
       </p:sp>
+      <p:sp>
+        <p:nvSpPr>
+          <p:cNvPr id="4" name="Content Placeholder 3"/>
+          <p:cNvSpPr>
+            <a:spLocks noGrp="1"/>
+          </p:cNvSpPr>
+          <p:nvPr>
+            <p:ph sz="quarter" idx="13"/>
+          </p:nvPr>
+        </p:nvSpPr>
+        <p:spPr/>
+        <p:txBody>
+          <a:bodyPr/>
+          <a:lstStyle/>
+          <a:p>
+            <a:r>
+              <a:rPr lang="en-US" dirty="0"/>
+              <a:t>Metadata</a:t>
+            </a:r>
+          </a:p>
+          <a:p>
+            <a:r>
+              <a:rPr lang="en-US" dirty="0"/>
+              <a:t>Basic abstractions</a:t>
+            </a:r>
+          </a:p>
+          <a:p>
+            <a:r>
+              <a:rPr lang="en-US" dirty="0"/>
+              <a:t>How to get a running cluster</a:t>
+            </a:r>
+          </a:p>
+          <a:p>
+            <a:r>
+              <a:rPr lang="en-US" dirty="0"/>
+              <a:t>Where to </a:t>
+            </a:r>
+            <a:r>
+              <a:rPr lang="en-US" dirty="0" smtClean="0"/>
+              <a:t>start</a:t>
+            </a:r>
+            <a:endParaRPr lang="en-US" dirty="0"/>
+          </a:p>
+        </p:txBody>
+      </p:sp>
     </p:spTree>
     <p:extLst>
       <p:ext uri="{BB962C8B-B14F-4D97-AF65-F5344CB8AC3E}">
-        <p14:creationId xmlns:p14="http://schemas.microsoft.com/office/powerpoint/2010/main" val="151088669"/>
+        <p14:creationId xmlns:p14="http://schemas.microsoft.com/office/powerpoint/2010/main" val="716733338"/>
       </p:ext>
     </p:extLst>
   </p:cSld>
@@ -23035,34 +22426,7 @@
       </p:grpSpPr>
       <p:sp>
         <p:nvSpPr>
-          <p:cNvPr id="2" name="Title 1"/>
-          <p:cNvSpPr>
-            <a:spLocks noGrp="1"/>
-          </p:cNvSpPr>
-          <p:nvPr>
-            <p:ph type="title"/>
-          </p:nvPr>
-        </p:nvSpPr>
-        <p:spPr/>
-        <p:txBody>
-          <a:bodyPr/>
-          <a:lstStyle/>
-          <a:p>
-            <a:r>
-              <a:rPr lang="en-US" dirty="0" smtClean="0"/>
-              <a:t>Sneak Preview</a:t>
-            </a:r>
-            <a:r>
-              <a:rPr lang="en-US" smtClean="0"/>
-              <a:t>: Gestalt</a:t>
-            </a:r>
-            <a:endParaRPr lang="en-US" dirty="0"/>
-          </a:p>
-        </p:txBody>
-      </p:sp>
-      <p:sp>
-        <p:nvSpPr>
-          <p:cNvPr id="3" name="Slide Number Placeholder 2"/>
+          <p:cNvPr id="2" name="Slide Number Placeholder 1"/>
           <p:cNvSpPr>
             <a:spLocks noGrp="1"/>
           </p:cNvSpPr>
@@ -23083,10 +22447,57 @@
           </a:p>
         </p:txBody>
       </p:sp>
+      <p:sp>
+        <p:nvSpPr>
+          <p:cNvPr id="3" name="Title 2"/>
+          <p:cNvSpPr>
+            <a:spLocks noGrp="1"/>
+          </p:cNvSpPr>
+          <p:nvPr>
+            <p:ph type="title"/>
+          </p:nvPr>
+        </p:nvSpPr>
+        <p:spPr/>
+        <p:txBody>
+          <a:bodyPr/>
+          <a:lstStyle/>
+          <a:p>
+            <a:r>
+              <a:rPr lang="en-US" dirty="0" smtClean="0"/>
+              <a:t>Play hard!</a:t>
+            </a:r>
+            <a:endParaRPr lang="en-US" dirty="0"/>
+          </a:p>
+        </p:txBody>
+      </p:sp>
+      <p:pic>
+        <p:nvPicPr>
+          <p:cNvPr id="4" name="Picture 3"/>
+          <p:cNvPicPr>
+            <a:picLocks noChangeAspect="1"/>
+          </p:cNvPicPr>
+          <p:nvPr/>
+        </p:nvPicPr>
+        <p:blipFill>
+          <a:blip r:embed="rId2"/>
+          <a:stretch>
+            <a:fillRect/>
+          </a:stretch>
+        </p:blipFill>
+        <p:spPr>
+          <a:xfrm>
+            <a:off x="3028950" y="0"/>
+            <a:ext cx="6134100" cy="6858000"/>
+          </a:xfrm>
+          <a:prstGeom prst="rect">
+            <a:avLst/>
+          </a:prstGeom>
+        </p:spPr>
+      </p:pic>
     </p:spTree>
     <p:extLst>
       <p:ext uri="{BB962C8B-B14F-4D97-AF65-F5344CB8AC3E}">
-        <p14:creationId xmlns:p14="http://schemas.microsoft.com/office/powerpoint/2010/main" val="716733338"/>
+        <p14:creationId xmlns:p14="http://schemas.microsoft.com/office/powerpoint/2010/main" val="1713413936"/>
       </p:ext>
     </p:extLst>
   </p:cSld>

</xml_diff>